<commit_message>
Added Intro and Bolding
</commit_message>
<xml_diff>
--- a/Unix Operating System.pptx
+++ b/Unix Operating System.pptx
@@ -6,25 +6,28 @@
   </p:sldMasterIdLst>
   <p:sldIdLst>
     <p:sldId id="256" r:id="rId2"/>
-    <p:sldId id="257" r:id="rId3"/>
-    <p:sldId id="258" r:id="rId4"/>
-    <p:sldId id="259" r:id="rId5"/>
-    <p:sldId id="260" r:id="rId6"/>
-    <p:sldId id="261" r:id="rId7"/>
-    <p:sldId id="262" r:id="rId8"/>
-    <p:sldId id="263" r:id="rId9"/>
-    <p:sldId id="264" r:id="rId10"/>
-    <p:sldId id="265" r:id="rId11"/>
-    <p:sldId id="266" r:id="rId12"/>
-    <p:sldId id="267" r:id="rId13"/>
-    <p:sldId id="268" r:id="rId14"/>
-    <p:sldId id="269" r:id="rId15"/>
-    <p:sldId id="270" r:id="rId16"/>
-    <p:sldId id="271" r:id="rId17"/>
-    <p:sldId id="273" r:id="rId18"/>
-    <p:sldId id="272" r:id="rId19"/>
-    <p:sldId id="274" r:id="rId20"/>
-    <p:sldId id="275" r:id="rId21"/>
+    <p:sldId id="277" r:id="rId3"/>
+    <p:sldId id="278" r:id="rId4"/>
+    <p:sldId id="257" r:id="rId5"/>
+    <p:sldId id="258" r:id="rId6"/>
+    <p:sldId id="259" r:id="rId7"/>
+    <p:sldId id="260" r:id="rId8"/>
+    <p:sldId id="261" r:id="rId9"/>
+    <p:sldId id="262" r:id="rId10"/>
+    <p:sldId id="263" r:id="rId11"/>
+    <p:sldId id="264" r:id="rId12"/>
+    <p:sldId id="265" r:id="rId13"/>
+    <p:sldId id="266" r:id="rId14"/>
+    <p:sldId id="267" r:id="rId15"/>
+    <p:sldId id="268" r:id="rId16"/>
+    <p:sldId id="269" r:id="rId17"/>
+    <p:sldId id="270" r:id="rId18"/>
+    <p:sldId id="271" r:id="rId19"/>
+    <p:sldId id="272" r:id="rId20"/>
+    <p:sldId id="276" r:id="rId21"/>
+    <p:sldId id="273" r:id="rId22"/>
+    <p:sldId id="274" r:id="rId23"/>
+    <p:sldId id="275" r:id="rId24"/>
   </p:sldIdLst>
   <p:sldSz cx="9144000" cy="6858000" type="screen4x3"/>
   <p:notesSz cx="6858000" cy="9144000"/>
@@ -123,6 +126,22 @@
       </a:defRPr>
     </a:lvl9pPr>
   </p:defaultTextStyle>
+  <p:extLst>
+    <p:ext uri="{EFAFB233-063F-42B5-8137-9DF3F51BA10A}">
+      <p15:sldGuideLst xmlns:p15="http://schemas.microsoft.com/office/powerpoint/2012/main">
+        <p15:guide id="1" orient="horz" pos="2160">
+          <p15:clr>
+            <a:srgbClr val="A4A3A4"/>
+          </p15:clr>
+        </p15:guide>
+        <p15:guide id="2" pos="2880">
+          <p15:clr>
+            <a:srgbClr val="A4A3A4"/>
+          </p15:clr>
+        </p15:guide>
+      </p15:sldGuideLst>
+    </p:ext>
+  </p:extLst>
 </p:presentation>
 </file>
 
@@ -375,7 +394,7 @@
             <a:fld id="{1133655B-7A82-4D28-9791-885BD1445B5C}" type="datetimeFigureOut">
               <a:rPr lang="en-US" smtClean="0"/>
               <a:pPr/>
-              <a:t>11/28/2016</a:t>
+              <a:t>11/29/2016</a:t>
             </a:fld>
             <a:endParaRPr lang="en-US"/>
           </a:p>
@@ -600,7 +619,7 @@
             <a:fld id="{1133655B-7A82-4D28-9791-885BD1445B5C}" type="datetimeFigureOut">
               <a:rPr lang="en-US" smtClean="0"/>
               <a:pPr/>
-              <a:t>11/28/2016</a:t>
+              <a:t>11/29/2016</a:t>
             </a:fld>
             <a:endParaRPr lang="en-US"/>
           </a:p>
@@ -882,7 +901,7 @@
             <a:fld id="{1133655B-7A82-4D28-9791-885BD1445B5C}" type="datetimeFigureOut">
               <a:rPr lang="en-US" smtClean="0"/>
               <a:pPr/>
-              <a:t>11/28/2016</a:t>
+              <a:t>11/29/2016</a:t>
             </a:fld>
             <a:endParaRPr lang="en-US"/>
           </a:p>
@@ -1063,7 +1082,7 @@
             <a:fld id="{1133655B-7A82-4D28-9791-885BD1445B5C}" type="datetimeFigureOut">
               <a:rPr lang="en-US" smtClean="0"/>
               <a:pPr/>
-              <a:t>11/28/2016</a:t>
+              <a:t>11/29/2016</a:t>
             </a:fld>
             <a:endParaRPr lang="en-US"/>
           </a:p>
@@ -1423,7 +1442,7 @@
             <a:fld id="{1133655B-7A82-4D28-9791-885BD1445B5C}" type="datetimeFigureOut">
               <a:rPr lang="en-US" smtClean="0"/>
               <a:pPr/>
-              <a:t>11/28/2016</a:t>
+              <a:t>11/29/2016</a:t>
             </a:fld>
             <a:endParaRPr lang="en-US"/>
           </a:p>
@@ -1712,7 +1731,7 @@
             <a:fld id="{1133655B-7A82-4D28-9791-885BD1445B5C}" type="datetimeFigureOut">
               <a:rPr lang="en-US" smtClean="0"/>
               <a:pPr/>
-              <a:t>11/28/2016</a:t>
+              <a:t>11/29/2016</a:t>
             </a:fld>
             <a:endParaRPr lang="en-US"/>
           </a:p>
@@ -2136,7 +2155,7 @@
             <a:fld id="{1133655B-7A82-4D28-9791-885BD1445B5C}" type="datetimeFigureOut">
               <a:rPr lang="en-US" smtClean="0"/>
               <a:pPr/>
-              <a:t>11/28/2016</a:t>
+              <a:t>11/29/2016</a:t>
             </a:fld>
             <a:endParaRPr lang="en-US"/>
           </a:p>
@@ -2253,7 +2272,7 @@
             <a:fld id="{1133655B-7A82-4D28-9791-885BD1445B5C}" type="datetimeFigureOut">
               <a:rPr lang="en-US" smtClean="0"/>
               <a:pPr/>
-              <a:t>11/28/2016</a:t>
+              <a:t>11/29/2016</a:t>
             </a:fld>
             <a:endParaRPr lang="en-US"/>
           </a:p>
@@ -2345,7 +2364,7 @@
             <a:fld id="{1133655B-7A82-4D28-9791-885BD1445B5C}" type="datetimeFigureOut">
               <a:rPr lang="en-US" smtClean="0"/>
               <a:pPr/>
-              <a:t>11/28/2016</a:t>
+              <a:t>11/29/2016</a:t>
             </a:fld>
             <a:endParaRPr lang="en-US"/>
           </a:p>
@@ -2625,7 +2644,7 @@
             <a:fld id="{1133655B-7A82-4D28-9791-885BD1445B5C}" type="datetimeFigureOut">
               <a:rPr lang="en-US" smtClean="0"/>
               <a:pPr/>
-              <a:t>11/28/2016</a:t>
+              <a:t>11/29/2016</a:t>
             </a:fld>
             <a:endParaRPr lang="en-US"/>
           </a:p>
@@ -2993,7 +3012,7 @@
             <a:fld id="{1133655B-7A82-4D28-9791-885BD1445B5C}" type="datetimeFigureOut">
               <a:rPr lang="en-US" smtClean="0"/>
               <a:pPr/>
-              <a:t>11/28/2016</a:t>
+              <a:t>11/29/2016</a:t>
             </a:fld>
             <a:endParaRPr lang="en-US"/>
           </a:p>
@@ -3432,7 +3451,7 @@
             <a:fld id="{1133655B-7A82-4D28-9791-885BD1445B5C}" type="datetimeFigureOut">
               <a:rPr lang="en-US" smtClean="0"/>
               <a:pPr/>
-              <a:t>11/28/2016</a:t>
+              <a:t>11/29/2016</a:t>
             </a:fld>
             <a:endParaRPr lang="en-US"/>
           </a:p>
@@ -3912,7 +3931,7 @@
       </p:grpSpPr>
       <p:sp>
         <p:nvSpPr>
-          <p:cNvPr id="2" name="Title 1"/>
+          <p:cNvPr id="5" name="Title 4"/>
           <p:cNvSpPr>
             <a:spLocks noGrp="1"/>
           </p:cNvSpPr>
@@ -3927,23 +3946,7 @@
           <a:p>
             <a:r>
               <a:rPr lang="en-US" dirty="0" smtClean="0"/>
-              <a:t>2</a:t>
-            </a:r>
-            <a:r>
-              <a:rPr lang="en-US" baseline="30000" dirty="0" smtClean="0"/>
-              <a:t>nd</a:t>
-            </a:r>
-            <a:r>
-              <a:rPr lang="en-US" dirty="0" smtClean="0"/>
-              <a:t> and 3</a:t>
-            </a:r>
-            <a:r>
-              <a:rPr lang="en-US" baseline="30000" dirty="0" smtClean="0"/>
-              <a:t>rd</a:t>
-            </a:r>
-            <a:r>
-              <a:rPr lang="en-US" dirty="0" smtClean="0"/>
-              <a:t> Edition</a:t>
+              <a:t>Developers</a:t>
             </a:r>
             <a:endParaRPr lang="en-US" dirty="0"/>
           </a:p>
@@ -3951,7 +3954,7 @@
       </p:sp>
       <p:sp>
         <p:nvSpPr>
-          <p:cNvPr id="3" name="Content Placeholder 2"/>
+          <p:cNvPr id="6" name="Content Placeholder 5"/>
           <p:cNvSpPr>
             <a:spLocks noGrp="1"/>
           </p:cNvSpPr>
@@ -3966,47 +3969,30 @@
           <a:p>
             <a:r>
               <a:rPr lang="en-US" dirty="0" smtClean="0"/>
-              <a:t>Feb. </a:t>
-            </a:r>
-            <a:r>
-              <a:rPr lang="en-US" dirty="0" smtClean="0"/>
-              <a:t>1973</a:t>
+              <a:t>Brian Wilson Kernighan</a:t>
+            </a:r>
+          </a:p>
+          <a:p>
+            <a:r>
+              <a:rPr lang="en-US" dirty="0" smtClean="0"/>
+              <a:t>M. D. </a:t>
+            </a:r>
+            <a:r>
+              <a:rPr lang="en-US" dirty="0" err="1" smtClean="0"/>
+              <a:t>Mcllroy</a:t>
             </a:r>
             <a:endParaRPr lang="en-US" dirty="0" smtClean="0"/>
           </a:p>
           <a:p>
             <a:r>
               <a:rPr lang="en-US" dirty="0" smtClean="0"/>
-              <a:t>Total </a:t>
-            </a:r>
-            <a:r>
-              <a:rPr lang="en-US" dirty="0" smtClean="0"/>
-              <a:t>number of installations at the time was 10 - 16.</a:t>
-            </a:r>
-          </a:p>
-          <a:p>
-            <a:r>
-              <a:rPr lang="en-US" dirty="0" smtClean="0"/>
-              <a:t>Introduced C.</a:t>
-            </a:r>
-          </a:p>
-          <a:p>
-            <a:r>
-              <a:rPr lang="en-US" dirty="0" smtClean="0"/>
-              <a:t> Commands are split between /bin and /</a:t>
+              <a:t>Joe </a:t>
             </a:r>
             <a:r>
               <a:rPr lang="en-US" dirty="0" err="1" smtClean="0"/>
-              <a:t>usr</a:t>
-            </a:r>
-            <a:r>
-              <a:rPr lang="en-US" dirty="0" smtClean="0"/>
-              <a:t>/bin, requiring a search path</a:t>
-            </a:r>
-            <a:r>
-              <a:rPr lang="en-US" dirty="0" smtClean="0"/>
-              <a:t>.</a:t>
-            </a:r>
+              <a:t>Ossanna</a:t>
+            </a:r>
+            <a:endParaRPr lang="en-US" dirty="0" smtClean="0"/>
           </a:p>
           <a:p>
             <a:endParaRPr lang="en-US" dirty="0"/>
@@ -4015,7 +4001,7 @@
       </p:sp>
       <p:pic>
         <p:nvPicPr>
-          <p:cNvPr id="7" name="Content Placeholder 6" descr="unnamed.png"/>
+          <p:cNvPr id="8" name="Content Placeholder 7" descr="quote-debugging-is-twice-as-hard-as-writing-the-code-in-the-first-place-therefore-if-you-write-brian-kernighan-66-91-06.jpg"/>
           <p:cNvPicPr>
             <a:picLocks noGrp="1" noChangeAspect="1"/>
           </p:cNvPicPr>
@@ -4031,8 +4017,8 @@
         </p:blipFill>
         <p:spPr>
           <a:xfrm>
-            <a:off x="5238750" y="2656681"/>
-            <a:ext cx="2857500" cy="2857500"/>
+            <a:off x="4572000" y="2133600"/>
+            <a:ext cx="4343400" cy="3810000"/>
           </a:xfrm>
         </p:spPr>
       </p:pic>
@@ -4078,11 +4064,11 @@
           <a:p>
             <a:r>
               <a:rPr lang="en-US" dirty="0" smtClean="0"/>
-              <a:t>4</a:t>
+              <a:t>Versions - 1</a:t>
             </a:r>
             <a:r>
               <a:rPr lang="en-US" baseline="30000" dirty="0" smtClean="0"/>
-              <a:t>th</a:t>
+              <a:t>st</a:t>
             </a:r>
             <a:r>
               <a:rPr lang="en-US" dirty="0" smtClean="0"/>
@@ -4102,64 +4088,38 @@
             <p:ph sz="half" idx="1"/>
           </p:nvPr>
         </p:nvSpPr>
-        <p:spPr>
-          <a:xfrm>
-            <a:off x="457200" y="1773936"/>
-            <a:ext cx="4038600" cy="4855464"/>
-          </a:xfrm>
-        </p:spPr>
+        <p:spPr/>
         <p:txBody>
           <a:bodyPr>
-            <a:normAutofit/>
+            <a:normAutofit fontScale="92500"/>
           </a:bodyPr>
           <a:lstStyle/>
           <a:p>
             <a:r>
               <a:rPr lang="en-US" dirty="0" smtClean="0"/>
-              <a:t>Nov. </a:t>
-            </a:r>
-            <a:r>
-              <a:rPr lang="en-US" dirty="0" smtClean="0"/>
-              <a:t>1973</a:t>
-            </a:r>
-            <a:endParaRPr lang="en-US" dirty="0" smtClean="0"/>
-          </a:p>
-          <a:p>
-            <a:r>
-              <a:rPr lang="en-US" dirty="0" smtClean="0"/>
-              <a:t>First </a:t>
-            </a:r>
-            <a:r>
-              <a:rPr lang="en-US" dirty="0" smtClean="0"/>
-              <a:t>version written in C. Also introduced groups,       </a:t>
-            </a:r>
-            <a:r>
-              <a:rPr lang="en-US" dirty="0" err="1" smtClean="0"/>
-              <a:t>grep</a:t>
-            </a:r>
-            <a:r>
-              <a:rPr lang="en-US" dirty="0" smtClean="0"/>
-              <a:t>, and </a:t>
-            </a:r>
-            <a:r>
-              <a:rPr lang="en-US" dirty="0" err="1" smtClean="0"/>
-              <a:t>printf</a:t>
-            </a:r>
-            <a:r>
-              <a:rPr lang="en-US" dirty="0" smtClean="0"/>
-              <a:t>.</a:t>
-            </a:r>
-          </a:p>
-          <a:p>
-            <a:r>
-              <a:rPr lang="en-US" dirty="0" smtClean="0"/>
-              <a:t> The first public exposition of the operating system.</a:t>
-            </a:r>
-          </a:p>
-          <a:p>
-            <a:r>
-              <a:rPr lang="en-US" dirty="0" smtClean="0"/>
-              <a:t>Number of installations was listed as "above 20"</a:t>
+              <a:t>Released Nov. 3, 1971.</a:t>
+            </a:r>
+          </a:p>
+          <a:p>
+            <a:r>
+              <a:rPr lang="en-US" dirty="0" smtClean="0"/>
+              <a:t>based on the version that ran on the PDP-11 at the time. Includes the </a:t>
+            </a:r>
+            <a:r>
+              <a:rPr lang="en-US" b="1" dirty="0" smtClean="0"/>
+              <a:t>Thompson shell, mail, cp, and </a:t>
+            </a:r>
+            <a:r>
+              <a:rPr lang="en-US" b="1" dirty="0" err="1" smtClean="0"/>
+              <a:t>su</a:t>
+            </a:r>
+            <a:r>
+              <a:rPr lang="en-US" b="1" dirty="0" smtClean="0"/>
+              <a:t>. </a:t>
+            </a:r>
+            <a:r>
+              <a:rPr lang="en-US" dirty="0" smtClean="0"/>
+              <a:t>The operating system was two years old, having been ported from the PDP-7 to the PDP-11/20 in 1970.</a:t>
             </a:r>
             <a:endParaRPr lang="en-US" dirty="0"/>
           </a:p>
@@ -4167,7 +4127,7 @@
       </p:sp>
       <p:pic>
         <p:nvPicPr>
-          <p:cNvPr id="5" name="Content Placeholder 4" descr="images.jpg"/>
+          <p:cNvPr id="5" name="Content Placeholder 4" descr="dennis-richie-and-brian-kernighan-pdp-11.jpg"/>
           <p:cNvPicPr>
             <a:picLocks noGrp="1" noChangeAspect="1"/>
           </p:cNvPicPr>
@@ -4183,8 +4143,8 @@
         </p:blipFill>
         <p:spPr>
           <a:xfrm>
-            <a:off x="5253037" y="2819400"/>
-            <a:ext cx="2828925" cy="2075656"/>
+            <a:off x="4648200" y="2749328"/>
+            <a:ext cx="4038600" cy="2672207"/>
           </a:xfrm>
         </p:spPr>
       </p:pic>
@@ -4230,11 +4190,19 @@
           <a:p>
             <a:r>
               <a:rPr lang="en-US" dirty="0" smtClean="0"/>
-              <a:t>5</a:t>
+              <a:t>2</a:t>
             </a:r>
             <a:r>
               <a:rPr lang="en-US" baseline="30000" dirty="0" smtClean="0"/>
-              <a:t>th</a:t>
+              <a:t>nd</a:t>
+            </a:r>
+            <a:r>
+              <a:rPr lang="en-US" dirty="0" smtClean="0"/>
+              <a:t> and 3</a:t>
+            </a:r>
+            <a:r>
+              <a:rPr lang="en-US" baseline="30000" dirty="0" smtClean="0"/>
+              <a:t>rd</a:t>
             </a:r>
             <a:r>
               <a:rPr lang="en-US" dirty="0" smtClean="0"/>
@@ -4254,65 +4222,71 @@
             <p:ph sz="half" idx="1"/>
           </p:nvPr>
         </p:nvSpPr>
-        <p:spPr/>
-        <p:txBody>
-          <a:bodyPr>
-            <a:normAutofit fontScale="92500"/>
-          </a:bodyPr>
-          <a:lstStyle/>
-          <a:p>
-            <a:r>
-              <a:rPr lang="en-US" dirty="0" smtClean="0"/>
-              <a:t>Jun. </a:t>
-            </a:r>
-            <a:r>
-              <a:rPr lang="en-US" dirty="0" smtClean="0"/>
-              <a:t>1974</a:t>
-            </a:r>
-            <a:endParaRPr lang="en-US" dirty="0" smtClean="0"/>
-          </a:p>
-          <a:p>
-            <a:r>
-              <a:rPr lang="en-US" dirty="0" smtClean="0"/>
-              <a:t>Widely </a:t>
-            </a:r>
-            <a:r>
-              <a:rPr lang="en-US" dirty="0" smtClean="0"/>
-              <a:t>licensed to educational institutions.</a:t>
-            </a:r>
-          </a:p>
-          <a:p>
-            <a:r>
-              <a:rPr lang="en-US" dirty="0" smtClean="0"/>
-              <a:t> Introduced find, </a:t>
-            </a:r>
-            <a:r>
-              <a:rPr lang="en-US" dirty="0" err="1" smtClean="0"/>
-              <a:t>dd</a:t>
-            </a:r>
-            <a:r>
-              <a:rPr lang="en-US" dirty="0" smtClean="0"/>
-              <a:t>,    and the sticky bit.</a:t>
-            </a:r>
-          </a:p>
-          <a:p>
-            <a:r>
-              <a:rPr lang="en-US" dirty="0" smtClean="0"/>
-              <a:t>Targeted the PDP-11/40 and other 11 models with 18 bit addresses.</a:t>
-            </a:r>
-          </a:p>
-          <a:p>
-            <a:r>
-              <a:rPr lang="en-US" dirty="0" smtClean="0"/>
-              <a:t>Installations "above 50".</a:t>
-            </a:r>
+        <p:spPr>
+          <a:xfrm>
+            <a:off x="461818" y="1773936"/>
+            <a:ext cx="4038600" cy="4623816"/>
+          </a:xfrm>
+        </p:spPr>
+        <p:txBody>
+          <a:bodyPr/>
+          <a:lstStyle/>
+          <a:p>
+            <a:r>
+              <a:rPr lang="en-US" dirty="0" smtClean="0"/>
+              <a:t>Feb. 1973</a:t>
+            </a:r>
+          </a:p>
+          <a:p>
+            <a:r>
+              <a:rPr lang="en-US" dirty="0" smtClean="0"/>
+              <a:t>Total number of installations at the time was 10 - 16.</a:t>
+            </a:r>
+          </a:p>
+          <a:p>
+            <a:r>
+              <a:rPr lang="en-US" dirty="0" smtClean="0"/>
+              <a:t>Introduced C.</a:t>
+            </a:r>
+          </a:p>
+          <a:p>
+            <a:r>
+              <a:rPr lang="en-US" dirty="0" smtClean="0"/>
+              <a:t> Commands are split between </a:t>
+            </a:r>
+            <a:r>
+              <a:rPr lang="en-US" b="1" dirty="0" smtClean="0"/>
+              <a:t>/bin</a:t>
+            </a:r>
+            <a:r>
+              <a:rPr lang="en-US" dirty="0" smtClean="0"/>
+              <a:t> and </a:t>
+            </a:r>
+            <a:r>
+              <a:rPr lang="en-US" b="1" dirty="0" smtClean="0"/>
+              <a:t>/</a:t>
+            </a:r>
+            <a:r>
+              <a:rPr lang="en-US" b="1" dirty="0" err="1" smtClean="0"/>
+              <a:t>usr</a:t>
+            </a:r>
+            <a:r>
+              <a:rPr lang="en-US" b="1" dirty="0" smtClean="0"/>
+              <a:t>/bin</a:t>
+            </a:r>
+            <a:r>
+              <a:rPr lang="en-US" dirty="0" smtClean="0"/>
+              <a:t>, requiring a search path.</a:t>
+            </a:r>
+          </a:p>
+          <a:p>
             <a:endParaRPr lang="en-US" dirty="0"/>
           </a:p>
         </p:txBody>
       </p:sp>
       <p:pic>
         <p:nvPicPr>
-          <p:cNvPr id="5" name="Content Placeholder 4" descr="pdp1140.jpg"/>
+          <p:cNvPr id="7" name="Content Placeholder 6" descr="unnamed.png"/>
           <p:cNvPicPr>
             <a:picLocks noGrp="1" noChangeAspect="1"/>
           </p:cNvPicPr>
@@ -4328,8 +4302,8 @@
         </p:blipFill>
         <p:spPr>
           <a:xfrm>
-            <a:off x="4648200" y="2661373"/>
-            <a:ext cx="4038600" cy="2848117"/>
+            <a:off x="5238750" y="2656681"/>
+            <a:ext cx="2857500" cy="2857500"/>
           </a:xfrm>
         </p:spPr>
       </p:pic>
@@ -4375,7 +4349,7 @@
           <a:p>
             <a:r>
               <a:rPr lang="en-US" dirty="0" smtClean="0"/>
-              <a:t>6</a:t>
+              <a:t>4</a:t>
             </a:r>
             <a:r>
               <a:rPr lang="en-US" baseline="30000" dirty="0" smtClean="0"/>
@@ -4383,7 +4357,7 @@
             </a:r>
             <a:r>
               <a:rPr lang="en-US" dirty="0" smtClean="0"/>
-              <a:t>	Edition</a:t>
+              <a:t> Edition</a:t>
             </a:r>
             <a:endParaRPr lang="en-US" dirty="0"/>
           </a:p>
@@ -4399,46 +4373,51 @@
             <p:ph sz="half" idx="1"/>
           </p:nvPr>
         </p:nvSpPr>
-        <p:spPr/>
-        <p:txBody>
-          <a:bodyPr/>
-          <a:lstStyle/>
-          <a:p>
-            <a:r>
-              <a:rPr lang="en-US" dirty="0" smtClean="0"/>
-              <a:t>May </a:t>
-            </a:r>
-            <a:r>
-              <a:rPr lang="en-US" dirty="0" smtClean="0"/>
-              <a:t>1975</a:t>
-            </a:r>
-          </a:p>
-          <a:p>
-            <a:pPr>
-              <a:buNone/>
-            </a:pPr>
-            <a:endParaRPr lang="en-US" dirty="0" smtClean="0"/>
-          </a:p>
-          <a:p>
-            <a:r>
-              <a:rPr lang="en-US" dirty="0" smtClean="0"/>
-              <a:t>First version to be also licensed to commercial users</a:t>
-            </a:r>
-            <a:r>
-              <a:rPr lang="en-US" dirty="0" smtClean="0"/>
-              <a:t>, </a:t>
-            </a:r>
-            <a:r>
-              <a:rPr lang="en-US" dirty="0" smtClean="0"/>
-              <a:t>and to be ported to </a:t>
-            </a:r>
-            <a:r>
-              <a:rPr lang="en-US" dirty="0" smtClean="0"/>
-              <a:t>non-PDP </a:t>
-            </a:r>
-            <a:r>
-              <a:rPr lang="en-US" dirty="0" smtClean="0"/>
-              <a:t>hardware</a:t>
+        <p:spPr>
+          <a:xfrm>
+            <a:off x="457200" y="1773936"/>
+            <a:ext cx="4038600" cy="4855464"/>
+          </a:xfrm>
+        </p:spPr>
+        <p:txBody>
+          <a:bodyPr>
+            <a:normAutofit/>
+          </a:bodyPr>
+          <a:lstStyle/>
+          <a:p>
+            <a:r>
+              <a:rPr lang="en-US" dirty="0" smtClean="0"/>
+              <a:t>Nov. 1973</a:t>
+            </a:r>
+          </a:p>
+          <a:p>
+            <a:r>
+              <a:rPr lang="en-US" dirty="0" smtClean="0"/>
+              <a:t>First version written in C. Also introduced </a:t>
+            </a:r>
+            <a:r>
+              <a:rPr lang="en-US" b="1" dirty="0" smtClean="0"/>
+              <a:t>groups</a:t>
+            </a:r>
+            <a:r>
+              <a:rPr lang="en-US" dirty="0" smtClean="0"/>
+              <a:t>,       </a:t>
+            </a:r>
+            <a:r>
+              <a:rPr lang="en-US" b="1" dirty="0" err="1" smtClean="0"/>
+              <a:t>grep</a:t>
+            </a:r>
+            <a:r>
+              <a:rPr lang="en-US" dirty="0" smtClean="0"/>
+              <a:t>, and</a:t>
+            </a:r>
+            <a:r>
+              <a:rPr lang="en-US" b="1" dirty="0" smtClean="0"/>
+              <a:t> </a:t>
+            </a:r>
+            <a:r>
+              <a:rPr lang="en-US" b="1" dirty="0" err="1" smtClean="0"/>
+              <a:t>printf</a:t>
             </a:r>
             <a:r>
               <a:rPr lang="en-US" dirty="0" smtClean="0"/>
@@ -4446,28 +4425,15 @@
             </a:r>
           </a:p>
           <a:p>
-            <a:endParaRPr lang="en-US" dirty="0" smtClean="0"/>
-          </a:p>
-          <a:p>
-            <a:r>
-              <a:rPr lang="en-US" dirty="0" smtClean="0"/>
-              <a:t>Includes </a:t>
-            </a:r>
-            <a:r>
-              <a:rPr lang="en-US" dirty="0" err="1" smtClean="0"/>
-              <a:t>ratfor</a:t>
-            </a:r>
-            <a:r>
-              <a:rPr lang="en-US" dirty="0" smtClean="0"/>
-              <a:t> and </a:t>
-            </a:r>
-            <a:r>
-              <a:rPr lang="en-US" dirty="0" err="1" smtClean="0"/>
-              <a:t>bc</a:t>
-            </a:r>
-            <a:r>
-              <a:rPr lang="en-US" dirty="0" smtClean="0"/>
-              <a:t>.</a:t>
+            <a:r>
+              <a:rPr lang="en-US" dirty="0" smtClean="0"/>
+              <a:t> The first public exposition of the operating system.</a:t>
+            </a:r>
+          </a:p>
+          <a:p>
+            <a:r>
+              <a:rPr lang="en-US" dirty="0" smtClean="0"/>
+              <a:t>Number of installations was listed as "above 20"</a:t>
             </a:r>
             <a:endParaRPr lang="en-US" dirty="0"/>
           </a:p>
@@ -4475,9 +4441,9 @@
       </p:sp>
       <p:pic>
         <p:nvPicPr>
-          <p:cNvPr id="5" name="Content Placeholder 4" descr="Version_7_Unix_SIMH_PDP11_Emulation_DMR.png"/>
+          <p:cNvPr id="5" name="Content Placeholder 4" descr="images.jpg"/>
           <p:cNvPicPr>
-            <a:picLocks noGrp="1"/>
+            <a:picLocks noGrp="1" noChangeAspect="1"/>
           </p:cNvPicPr>
           <p:nvPr>
             <p:ph sz="half" idx="2"/>
@@ -4491,12 +4457,9 @@
         </p:blipFill>
         <p:spPr>
           <a:xfrm>
-            <a:off x="4648200" y="2590800"/>
-            <a:ext cx="4038600" cy="2783019"/>
+            <a:off x="5253037" y="2819400"/>
+            <a:ext cx="2828925" cy="2075656"/>
           </a:xfrm>
-          <a:prstGeom prst="rect">
-            <a:avLst/>
-          </a:prstGeom>
         </p:spPr>
       </p:pic>
     </p:spTree>
@@ -4541,7 +4504,7 @@
           <a:p>
             <a:r>
               <a:rPr lang="en-US" dirty="0" smtClean="0"/>
-              <a:t>7</a:t>
+              <a:t>5</a:t>
             </a:r>
             <a:r>
               <a:rPr lang="en-US" baseline="30000" dirty="0" smtClean="0"/>
@@ -4549,7 +4512,7 @@
             </a:r>
             <a:r>
               <a:rPr lang="en-US" dirty="0" smtClean="0"/>
-              <a:t> Edition	</a:t>
+              <a:t> Edition</a:t>
             </a:r>
             <a:endParaRPr lang="en-US" dirty="0"/>
           </a:p>
@@ -4568,90 +4531,73 @@
         <p:spPr/>
         <p:txBody>
           <a:bodyPr>
-            <a:noAutofit/>
+            <a:normAutofit fontScale="92500"/>
           </a:bodyPr>
           <a:lstStyle/>
           <a:p>
             <a:r>
-              <a:rPr lang="en-US" sz="2000" dirty="0" smtClean="0"/>
-              <a:t>Jan. 1979</a:t>
-            </a:r>
-            <a:endParaRPr lang="en-US" sz="2000" dirty="0" smtClean="0"/>
-          </a:p>
-          <a:p>
-            <a:r>
-              <a:rPr lang="en-US" sz="2000" dirty="0" smtClean="0"/>
-              <a:t>Includes the Bourne shell, </a:t>
-            </a:r>
-            <a:r>
-              <a:rPr lang="en-US" sz="2000" dirty="0" err="1" smtClean="0"/>
-              <a:t>cpio</a:t>
-            </a:r>
-            <a:r>
-              <a:rPr lang="en-US" sz="2000" dirty="0" smtClean="0"/>
-              <a:t>, </a:t>
-            </a:r>
-            <a:r>
-              <a:rPr lang="en-US" sz="2000" dirty="0" err="1" smtClean="0"/>
-              <a:t>sed</a:t>
-            </a:r>
-            <a:r>
-              <a:rPr lang="en-US" sz="2000" dirty="0" smtClean="0"/>
-              <a:t>, </a:t>
-            </a:r>
-            <a:r>
-              <a:rPr lang="en-US" sz="2000" dirty="0" err="1" smtClean="0"/>
-              <a:t>ioctl</a:t>
-            </a:r>
-            <a:r>
-              <a:rPr lang="en-US" sz="2000" dirty="0" smtClean="0"/>
-              <a:t>, </a:t>
-            </a:r>
-            <a:r>
-              <a:rPr lang="en-US" sz="2000" dirty="0" err="1" smtClean="0"/>
-              <a:t>awk</a:t>
-            </a:r>
-            <a:r>
-              <a:rPr lang="en-US" sz="2000" dirty="0" smtClean="0"/>
-              <a:t>, f77, spell, </a:t>
-            </a:r>
-            <a:r>
-              <a:rPr lang="en-US" sz="2000" dirty="0" err="1" smtClean="0"/>
-              <a:t>stdio</a:t>
-            </a:r>
-            <a:r>
-              <a:rPr lang="en-US" sz="2000" dirty="0" smtClean="0"/>
-              <a:t> and </a:t>
-            </a:r>
-            <a:r>
-              <a:rPr lang="en-US" sz="2000" dirty="0" err="1" smtClean="0"/>
-              <a:t>pcc</a:t>
-            </a:r>
-            <a:r>
-              <a:rPr lang="en-US" sz="2000" dirty="0" smtClean="0"/>
-              <a:t> replacing the Dennis Ritchie's C compiler</a:t>
-            </a:r>
-            <a:r>
-              <a:rPr lang="en-US" sz="2000" dirty="0" smtClean="0"/>
+              <a:rPr lang="en-US" dirty="0" smtClean="0"/>
+              <a:t>Jun. 1974</a:t>
+            </a:r>
+          </a:p>
+          <a:p>
+            <a:r>
+              <a:rPr lang="en-US" dirty="0" smtClean="0"/>
+              <a:t>Widely licensed to educational institutions.</a:t>
+            </a:r>
+          </a:p>
+          <a:p>
+            <a:r>
+              <a:rPr lang="en-US" dirty="0" smtClean="0"/>
+              <a:t> Introduced </a:t>
+            </a:r>
+            <a:r>
+              <a:rPr lang="en-US" b="1" dirty="0" smtClean="0"/>
+              <a:t>find</a:t>
+            </a:r>
+            <a:r>
+              <a:rPr lang="en-US" dirty="0" smtClean="0"/>
+              <a:t>, </a:t>
+            </a:r>
+            <a:r>
+              <a:rPr lang="en-US" b="1" dirty="0" err="1" smtClean="0"/>
+              <a:t>dd</a:t>
+            </a:r>
+            <a:r>
+              <a:rPr lang="en-US" dirty="0" smtClean="0"/>
+              <a:t>,    and the </a:t>
+            </a:r>
+            <a:r>
+              <a:rPr lang="en-US" b="1" dirty="0" smtClean="0"/>
+              <a:t>sticky bit</a:t>
+            </a:r>
+            <a:r>
+              <a:rPr lang="en-US" dirty="0" smtClean="0"/>
               <a:t>.</a:t>
             </a:r>
           </a:p>
           <a:p>
             <a:r>
-              <a:rPr lang="en-US" sz="2000" dirty="0" smtClean="0"/>
-              <a:t> </a:t>
-            </a:r>
-            <a:r>
-              <a:rPr lang="en-US" sz="2000" dirty="0" smtClean="0"/>
-              <a:t>The ancestor of all modern UNIX systems and the last release of Research Unix to see widespread external distributions. Merged most of the utilities of PWB/UNIX with an extensively modified kernel with almost 80% more lines of code than V6. </a:t>
-            </a:r>
-            <a:endParaRPr lang="en-US" sz="2000" dirty="0"/>
+              <a:rPr lang="en-US" dirty="0" smtClean="0"/>
+              <a:t>Targeted </a:t>
+            </a:r>
+            <a:r>
+              <a:rPr lang="en-US" dirty="0" smtClean="0"/>
+              <a:t>the PDP-11/40 and other 11 models with 18 bit addresses.</a:t>
+            </a:r>
+          </a:p>
+          <a:p>
+            <a:r>
+              <a:rPr lang="en-US" dirty="0" smtClean="0"/>
+              <a:t>Installations "above 50".</a:t>
+            </a:r>
+            <a:endParaRPr lang="en-US" dirty="0"/>
           </a:p>
         </p:txBody>
       </p:sp>
       <p:pic>
         <p:nvPicPr>
-          <p:cNvPr id="5" name="Content Placeholder 4" descr="v7unix-1.png"/>
+          <p:cNvPr id="5" name="Content Placeholder 4" descr="pdp1140.jpg"/>
           <p:cNvPicPr>
             <a:picLocks noGrp="1" noChangeAspect="1"/>
           </p:cNvPicPr>
@@ -4667,8 +4613,8 @@
         </p:blipFill>
         <p:spPr>
           <a:xfrm>
-            <a:off x="4648200" y="2114962"/>
-            <a:ext cx="4038600" cy="3940938"/>
+            <a:off x="4648200" y="2661373"/>
+            <a:ext cx="4038600" cy="2848117"/>
           </a:xfrm>
         </p:spPr>
       </p:pic>
@@ -4714,7 +4660,7 @@
           <a:p>
             <a:r>
               <a:rPr lang="en-US" dirty="0" smtClean="0"/>
-              <a:t>8</a:t>
+              <a:t>6</a:t>
             </a:r>
             <a:r>
               <a:rPr lang="en-US" baseline="30000" dirty="0" smtClean="0"/>
@@ -4740,60 +4686,53 @@
         </p:nvSpPr>
         <p:spPr/>
         <p:txBody>
-          <a:bodyPr>
-            <a:normAutofit fontScale="77500" lnSpcReduction="20000"/>
-          </a:bodyPr>
-          <a:lstStyle/>
-          <a:p>
-            <a:r>
-              <a:rPr lang="en-US" dirty="0" smtClean="0"/>
-              <a:t>Feb. </a:t>
-            </a:r>
-            <a:r>
-              <a:rPr lang="en-US" dirty="0" smtClean="0"/>
-              <a:t>1985</a:t>
-            </a:r>
-          </a:p>
-          <a:p>
-            <a:r>
-              <a:rPr lang="en-US" dirty="0" smtClean="0"/>
-              <a:t>Used internally, and only licensed for educational use</a:t>
+          <a:bodyPr/>
+          <a:lstStyle/>
+          <a:p>
+            <a:r>
+              <a:rPr lang="en-US" dirty="0" smtClean="0"/>
+              <a:t>May 1975</a:t>
+            </a:r>
+          </a:p>
+          <a:p>
+            <a:pPr>
+              <a:buNone/>
+            </a:pPr>
+            <a:endParaRPr lang="en-US" dirty="0" smtClean="0"/>
+          </a:p>
+          <a:p>
+            <a:r>
+              <a:rPr lang="en-US" dirty="0" smtClean="0"/>
+              <a:t>First version to be also licensed to commercial users, and to be ported to non-PDP hardware.</a:t>
+            </a:r>
+          </a:p>
+          <a:p>
+            <a:endParaRPr lang="en-US" dirty="0" smtClean="0"/>
+          </a:p>
+          <a:p>
+            <a:r>
+              <a:rPr lang="en-US" dirty="0" smtClean="0"/>
+              <a:t>Includes </a:t>
+            </a:r>
+            <a:r>
+              <a:rPr lang="en-US" b="1" dirty="0" err="1" smtClean="0"/>
+              <a:t>ratfor</a:t>
+            </a:r>
+            <a:r>
+              <a:rPr lang="en-US" b="1" dirty="0" smtClean="0"/>
+              <a:t> </a:t>
+            </a:r>
+            <a:r>
+              <a:rPr lang="en-US" dirty="0" smtClean="0"/>
+              <a:t>and </a:t>
+            </a:r>
+            <a:r>
+              <a:rPr lang="en-US" b="1" dirty="0" err="1" smtClean="0"/>
+              <a:t>bc</a:t>
             </a:r>
             <a:r>
               <a:rPr lang="en-US" dirty="0" smtClean="0"/>
               <a:t>.</a:t>
-            </a:r>
-          </a:p>
-          <a:p>
-            <a:r>
-              <a:rPr lang="en-US" dirty="0" smtClean="0"/>
-              <a:t>The </a:t>
-            </a:r>
-            <a:r>
-              <a:rPr lang="en-US" dirty="0" err="1" smtClean="0"/>
-              <a:t>Blit</a:t>
-            </a:r>
-            <a:r>
-              <a:rPr lang="en-US" dirty="0" smtClean="0"/>
-              <a:t> graphics terminal became the primary user interface</a:t>
-            </a:r>
-            <a:r>
-              <a:rPr lang="en-US" dirty="0" smtClean="0"/>
-              <a:t>.</a:t>
-            </a:r>
-          </a:p>
-          <a:p>
-            <a:r>
-              <a:rPr lang="en-US" dirty="0" smtClean="0"/>
-              <a:t>Added a network </a:t>
-            </a:r>
-            <a:r>
-              <a:rPr lang="en-US" dirty="0" err="1" smtClean="0"/>
-              <a:t>filesystem</a:t>
-            </a:r>
-            <a:r>
-              <a:rPr lang="en-US" dirty="0" smtClean="0"/>
-              <a:t> that allowed accessing remote computers' files as /n/hostname/path, and a regular expression library that introduced an API later mimicked by Henry Spencer's reimplementation.</a:t>
             </a:r>
             <a:endParaRPr lang="en-US" dirty="0"/>
           </a:p>
@@ -4801,9 +4740,9 @@
       </p:sp>
       <p:pic>
         <p:nvPicPr>
-          <p:cNvPr id="5" name="Content Placeholder 4" descr="download (1).jpg"/>
+          <p:cNvPr id="5" name="Content Placeholder 4" descr="Version_7_Unix_SIMH_PDP11_Emulation_DMR.png"/>
           <p:cNvPicPr>
-            <a:picLocks noGrp="1" noChangeAspect="1"/>
+            <a:picLocks noGrp="1"/>
           </p:cNvPicPr>
           <p:nvPr>
             <p:ph sz="half" idx="2"/>
@@ -4817,9 +4756,12 @@
         </p:blipFill>
         <p:spPr>
           <a:xfrm>
-            <a:off x="5105400" y="3352006"/>
-            <a:ext cx="3124200" cy="1466850"/>
+            <a:off x="4648200" y="2590800"/>
+            <a:ext cx="4038600" cy="2783019"/>
           </a:xfrm>
+          <a:prstGeom prst="rect">
+            <a:avLst/>
+          </a:prstGeom>
         </p:spPr>
       </p:pic>
     </p:spTree>
@@ -4864,7 +4806,7 @@
           <a:p>
             <a:r>
               <a:rPr lang="en-US" dirty="0" smtClean="0"/>
-              <a:t>9</a:t>
+              <a:t>7</a:t>
             </a:r>
             <a:r>
               <a:rPr lang="en-US" baseline="30000" dirty="0" smtClean="0"/>
@@ -4872,7 +4814,7 @@
             </a:r>
             <a:r>
               <a:rPr lang="en-US" dirty="0" smtClean="0"/>
-              <a:t> Edition</a:t>
+              <a:t> Edition	</a:t>
             </a:r>
             <a:endParaRPr lang="en-US" dirty="0"/>
           </a:p>
@@ -4891,51 +4833,85 @@
         <p:spPr/>
         <p:txBody>
           <a:bodyPr>
-            <a:normAutofit fontScale="85000" lnSpcReduction="20000"/>
+            <a:noAutofit/>
           </a:bodyPr>
           <a:lstStyle/>
           <a:p>
             <a:r>
-              <a:rPr lang="en-US" dirty="0" smtClean="0"/>
-              <a:t>Sep. </a:t>
-            </a:r>
-            <a:r>
-              <a:rPr lang="en-US" dirty="0" smtClean="0"/>
-              <a:t>1986</a:t>
-            </a:r>
-          </a:p>
-          <a:p>
-            <a:r>
-              <a:rPr lang="en-US" dirty="0" smtClean="0"/>
-              <a:t>Featured a generalized version of the Streams IPC mechanism introduced in V8</a:t>
-            </a:r>
-            <a:r>
-              <a:rPr lang="en-US" dirty="0" smtClean="0"/>
-              <a:t>.</a:t>
-            </a:r>
-          </a:p>
-          <a:p>
-            <a:r>
-              <a:rPr lang="en-US" dirty="0" smtClean="0"/>
-              <a:t>The mount system call was extended to connect a stream to a file, the other end of which could be connected to a (user-level) program. This mechanism was used to implement network connection code in </a:t>
-            </a:r>
-            <a:r>
-              <a:rPr lang="en-US" dirty="0" err="1" smtClean="0"/>
-              <a:t>userspace</a:t>
-            </a:r>
-            <a:r>
-              <a:rPr lang="en-US" dirty="0" smtClean="0"/>
-              <a:t>.</a:t>
-            </a:r>
-          </a:p>
-          <a:p>
-            <a:endParaRPr lang="en-US" dirty="0"/>
+              <a:rPr lang="en-US" sz="2000" dirty="0" smtClean="0"/>
+              <a:t>Jan. 1979</a:t>
+            </a:r>
+          </a:p>
+          <a:p>
+            <a:r>
+              <a:rPr lang="en-US" sz="2000" dirty="0" smtClean="0"/>
+              <a:t>Includes </a:t>
+            </a:r>
+            <a:r>
+              <a:rPr lang="en-US" sz="2000" b="1" dirty="0" smtClean="0"/>
+              <a:t>the Bourne shell, </a:t>
+            </a:r>
+            <a:r>
+              <a:rPr lang="en-US" sz="2000" b="1" dirty="0" err="1" smtClean="0"/>
+              <a:t>cpio</a:t>
+            </a:r>
+            <a:r>
+              <a:rPr lang="en-US" sz="2000" b="1" dirty="0" smtClean="0"/>
+              <a:t>, </a:t>
+            </a:r>
+            <a:r>
+              <a:rPr lang="en-US" sz="2000" b="1" dirty="0" err="1" smtClean="0"/>
+              <a:t>sed</a:t>
+            </a:r>
+            <a:r>
+              <a:rPr lang="en-US" sz="2000" b="1" dirty="0" smtClean="0"/>
+              <a:t>, </a:t>
+            </a:r>
+            <a:r>
+              <a:rPr lang="en-US" sz="2000" b="1" dirty="0" err="1" smtClean="0"/>
+              <a:t>ioctl</a:t>
+            </a:r>
+            <a:r>
+              <a:rPr lang="en-US" sz="2000" b="1" dirty="0" smtClean="0"/>
+              <a:t>, </a:t>
+            </a:r>
+            <a:r>
+              <a:rPr lang="en-US" sz="2000" b="1" dirty="0" err="1" smtClean="0"/>
+              <a:t>awk</a:t>
+            </a:r>
+            <a:r>
+              <a:rPr lang="en-US" sz="2000" b="1" dirty="0" smtClean="0"/>
+              <a:t>, f77, spell, </a:t>
+            </a:r>
+            <a:r>
+              <a:rPr lang="en-US" sz="2000" b="1" dirty="0" err="1" smtClean="0"/>
+              <a:t>stdio</a:t>
+            </a:r>
+            <a:r>
+              <a:rPr lang="en-US" sz="2000" b="1" dirty="0" smtClean="0"/>
+              <a:t> and </a:t>
+            </a:r>
+            <a:r>
+              <a:rPr lang="en-US" sz="2000" b="1" dirty="0" err="1" smtClean="0"/>
+              <a:t>pcc</a:t>
+            </a:r>
+            <a:r>
+              <a:rPr lang="en-US" sz="2000" dirty="0" smtClean="0"/>
+              <a:t> replacing the Dennis Ritchie's C compiler.</a:t>
+            </a:r>
+          </a:p>
+          <a:p>
+            <a:r>
+              <a:rPr lang="en-US" sz="2000" dirty="0" smtClean="0"/>
+              <a:t> The ancestor of all modern UNIX systems and the last release of Research Unix to see widespread external distributions. Merged most of the utilities of PWB/UNIX with an extensively modified kernel with almost 80% more lines of code than V6. </a:t>
+            </a:r>
+            <a:endParaRPr lang="en-US" sz="2000" dirty="0"/>
           </a:p>
         </p:txBody>
       </p:sp>
       <p:pic>
         <p:nvPicPr>
-          <p:cNvPr id="5" name="Content Placeholder 4" descr="ArchitectureCloudLinksSameSite.png"/>
+          <p:cNvPr id="5" name="Content Placeholder 4" descr="v7unix-1.png"/>
           <p:cNvPicPr>
             <a:picLocks noGrp="1" noChangeAspect="1"/>
           </p:cNvPicPr>
@@ -4951,8 +4927,8 @@
         </p:blipFill>
         <p:spPr>
           <a:xfrm>
-            <a:off x="5029200" y="2438400"/>
-            <a:ext cx="3725835" cy="2794376"/>
+            <a:off x="4648200" y="2114962"/>
+            <a:ext cx="4038600" cy="3940938"/>
           </a:xfrm>
         </p:spPr>
       </p:pic>
@@ -4998,7 +4974,90 @@
           <a:p>
             <a:r>
               <a:rPr lang="en-US" dirty="0" smtClean="0"/>
-              <a:t>Sample Screenshots</a:t>
+              <a:t>8</a:t>
+            </a:r>
+            <a:r>
+              <a:rPr lang="en-US" baseline="30000" dirty="0" smtClean="0"/>
+              <a:t>th</a:t>
+            </a:r>
+            <a:r>
+              <a:rPr lang="en-US" dirty="0" smtClean="0"/>
+              <a:t>	Edition</a:t>
+            </a:r>
+            <a:endParaRPr lang="en-US" dirty="0"/>
+          </a:p>
+        </p:txBody>
+      </p:sp>
+      <p:sp>
+        <p:nvSpPr>
+          <p:cNvPr id="3" name="Content Placeholder 2"/>
+          <p:cNvSpPr>
+            <a:spLocks noGrp="1"/>
+          </p:cNvSpPr>
+          <p:nvPr>
+            <p:ph sz="half" idx="1"/>
+          </p:nvPr>
+        </p:nvSpPr>
+        <p:spPr/>
+        <p:txBody>
+          <a:bodyPr>
+            <a:normAutofit fontScale="77500" lnSpcReduction="20000"/>
+          </a:bodyPr>
+          <a:lstStyle/>
+          <a:p>
+            <a:r>
+              <a:rPr lang="en-US" dirty="0" smtClean="0"/>
+              <a:t>Feb. 1985</a:t>
+            </a:r>
+          </a:p>
+          <a:p>
+            <a:r>
+              <a:rPr lang="en-US" dirty="0" smtClean="0"/>
+              <a:t>Used internally, and only licensed for educational use.</a:t>
+            </a:r>
+          </a:p>
+          <a:p>
+            <a:r>
+              <a:rPr lang="en-US" dirty="0" smtClean="0"/>
+              <a:t>The </a:t>
+            </a:r>
+            <a:r>
+              <a:rPr lang="en-US" dirty="0" err="1" smtClean="0"/>
+              <a:t>Blit</a:t>
+            </a:r>
+            <a:r>
+              <a:rPr lang="en-US" dirty="0" smtClean="0"/>
+              <a:t> graphics terminal became the primary user interface.</a:t>
+            </a:r>
+          </a:p>
+          <a:p>
+            <a:r>
+              <a:rPr lang="en-US" dirty="0" smtClean="0"/>
+              <a:t>Added a network </a:t>
+            </a:r>
+            <a:r>
+              <a:rPr lang="en-US" dirty="0" err="1" smtClean="0"/>
+              <a:t>filesystem</a:t>
+            </a:r>
+            <a:r>
+              <a:rPr lang="en-US" dirty="0" smtClean="0"/>
+              <a:t> that allowed accessing remote computers' files as </a:t>
+            </a:r>
+            <a:r>
+              <a:rPr lang="en-US" b="1" dirty="0" smtClean="0"/>
+              <a:t>/n/hostname/path</a:t>
+            </a:r>
+            <a:r>
+              <a:rPr lang="en-US" dirty="0" smtClean="0"/>
+              <a:t>, and a </a:t>
+            </a:r>
+            <a:r>
+              <a:rPr lang="en-US" b="1" dirty="0" smtClean="0"/>
+              <a:t>regular expression library </a:t>
+            </a:r>
+            <a:r>
+              <a:rPr lang="en-US" dirty="0" smtClean="0"/>
+              <a:t>that introduced an API later mimicked by Henry Spencer's reimplementation.</a:t>
             </a:r>
             <a:endParaRPr lang="en-US" dirty="0"/>
           </a:p>
@@ -5006,12 +5065,12 @@
       </p:sp>
       <p:pic>
         <p:nvPicPr>
-          <p:cNvPr id="5" name="Content Placeholder 4" descr="lynis-screenshot.png"/>
+          <p:cNvPr id="5" name="Content Placeholder 4" descr="download (1).jpg"/>
           <p:cNvPicPr>
             <a:picLocks noGrp="1" noChangeAspect="1"/>
           </p:cNvPicPr>
           <p:nvPr>
-            <p:ph sz="half" idx="1"/>
+            <p:ph sz="half" idx="2"/>
           </p:nvPr>
         </p:nvPicPr>
         <p:blipFill>
@@ -5022,8 +5081,8 @@
         </p:blipFill>
         <p:spPr>
           <a:xfrm>
-            <a:off x="1600200" y="1752600"/>
-            <a:ext cx="6165849" cy="4624387"/>
+            <a:off x="5105400" y="3352006"/>
+            <a:ext cx="3124200" cy="1466850"/>
           </a:xfrm>
         </p:spPr>
       </p:pic>
@@ -5069,7 +5128,7 @@
           <a:p>
             <a:r>
               <a:rPr lang="en-US" dirty="0" smtClean="0"/>
-              <a:t>10</a:t>
+              <a:t>9</a:t>
             </a:r>
             <a:r>
               <a:rPr lang="en-US" baseline="30000" dirty="0" smtClean="0"/>
@@ -5096,60 +5155,47 @@
         <p:spPr/>
         <p:txBody>
           <a:bodyPr>
-            <a:normAutofit fontScale="77500" lnSpcReduction="20000"/>
+            <a:normAutofit fontScale="85000" lnSpcReduction="20000"/>
           </a:bodyPr>
           <a:lstStyle/>
           <a:p>
             <a:r>
               <a:rPr lang="en-US" dirty="0" smtClean="0"/>
-              <a:t>Oct. 1989</a:t>
-            </a:r>
-          </a:p>
-          <a:p>
-            <a:r>
-              <a:rPr lang="en-US" dirty="0" smtClean="0"/>
-              <a:t>Last Research Unix. </a:t>
-            </a:r>
-            <a:endParaRPr lang="en-US" dirty="0" smtClean="0"/>
-          </a:p>
-          <a:p>
-            <a:r>
-              <a:rPr lang="en-US" dirty="0" smtClean="0"/>
-              <a:t>According to Dennis Ritchie, V9 and V10 were "conceptual": manuals existed, but no OS distributions "in complete and coherent form</a:t>
-            </a:r>
-            <a:r>
-              <a:rPr lang="en-US" dirty="0" smtClean="0"/>
-              <a:t>".</a:t>
-            </a:r>
-          </a:p>
-          <a:p>
-            <a:r>
-              <a:rPr lang="en-US" dirty="0" smtClean="0"/>
-              <a:t>Novelties included graphics typesetting tools designed to work with </a:t>
-            </a:r>
-            <a:r>
-              <a:rPr lang="en-US" dirty="0" err="1" smtClean="0"/>
-              <a:t>troff</a:t>
-            </a:r>
-            <a:r>
-              <a:rPr lang="en-US" dirty="0" smtClean="0"/>
-              <a:t>, a C interpreter, animation programs, and several tools later found in Plan 9: the Mk build tool and the </a:t>
-            </a:r>
-            <a:r>
-              <a:rPr lang="en-US" dirty="0" err="1" smtClean="0"/>
-              <a:t>rc</a:t>
-            </a:r>
-            <a:r>
-              <a:rPr lang="en-US" dirty="0" smtClean="0"/>
-              <a:t> shell. </a:t>
-            </a:r>
+              <a:t>Sep. 1986</a:t>
+            </a:r>
+          </a:p>
+          <a:p>
+            <a:r>
+              <a:rPr lang="en-US" dirty="0" smtClean="0"/>
+              <a:t>Featured a generalized version of the Streams IPC mechanism introduced in V8.</a:t>
+            </a:r>
+          </a:p>
+          <a:p>
+            <a:r>
+              <a:rPr lang="en-US" dirty="0" smtClean="0"/>
+              <a:t>The mount system call was extended to connect a stream to a file, the other end of which could be connected to a (user-level) program. This mechanism was used to implement </a:t>
+            </a:r>
+            <a:r>
+              <a:rPr lang="en-US" b="1" dirty="0" smtClean="0"/>
+              <a:t>network connection code in </a:t>
+            </a:r>
+            <a:r>
+              <a:rPr lang="en-US" b="1" dirty="0" err="1" smtClean="0"/>
+              <a:t>userspace</a:t>
+            </a:r>
+            <a:r>
+              <a:rPr lang="en-US" dirty="0" smtClean="0"/>
+              <a:t>.</a:t>
+            </a:r>
+          </a:p>
+          <a:p>
             <a:endParaRPr lang="en-US" dirty="0"/>
           </a:p>
         </p:txBody>
       </p:sp>
       <p:pic>
         <p:nvPicPr>
-          <p:cNvPr id="5" name="Content Placeholder 4" descr="images (1).jpg"/>
+          <p:cNvPr id="5" name="Content Placeholder 4" descr="ArchitectureCloudLinksSameSite.png"/>
           <p:cNvPicPr>
             <a:picLocks noGrp="1" noChangeAspect="1"/>
           </p:cNvPicPr>
@@ -5165,8 +5211,8 @@
         </p:blipFill>
         <p:spPr>
           <a:xfrm>
-            <a:off x="5029200" y="2362200"/>
-            <a:ext cx="3155950" cy="2761456"/>
+            <a:off x="5029200" y="2438400"/>
+            <a:ext cx="3725835" cy="2794376"/>
           </a:xfrm>
         </p:spPr>
       </p:pic>
@@ -5197,7 +5243,7 @@
       </p:grpSpPr>
       <p:sp>
         <p:nvSpPr>
-          <p:cNvPr id="5" name="Title 4"/>
+          <p:cNvPr id="2" name="Title 1"/>
           <p:cNvSpPr>
             <a:spLocks noGrp="1"/>
           </p:cNvSpPr>
@@ -5212,7 +5258,111 @@
           <a:p>
             <a:r>
               <a:rPr lang="en-US" dirty="0" smtClean="0"/>
-              <a:t>Sample Screenshots (cont.)</a:t>
+              <a:t>10</a:t>
+            </a:r>
+            <a:r>
+              <a:rPr lang="en-US" baseline="30000" dirty="0" smtClean="0"/>
+              <a:t>th</a:t>
+            </a:r>
+            <a:r>
+              <a:rPr lang="en-US" dirty="0" smtClean="0"/>
+              <a:t> Edition</a:t>
+            </a:r>
+            <a:endParaRPr lang="en-US" dirty="0"/>
+          </a:p>
+        </p:txBody>
+      </p:sp>
+      <p:sp>
+        <p:nvSpPr>
+          <p:cNvPr id="3" name="Content Placeholder 2"/>
+          <p:cNvSpPr>
+            <a:spLocks noGrp="1"/>
+          </p:cNvSpPr>
+          <p:nvPr>
+            <p:ph sz="half" idx="1"/>
+          </p:nvPr>
+        </p:nvSpPr>
+        <p:spPr>
+          <a:xfrm>
+            <a:off x="447964" y="1806263"/>
+            <a:ext cx="4038600" cy="4623816"/>
+          </a:xfrm>
+        </p:spPr>
+        <p:txBody>
+          <a:bodyPr>
+            <a:normAutofit fontScale="77500" lnSpcReduction="20000"/>
+          </a:bodyPr>
+          <a:lstStyle/>
+          <a:p>
+            <a:r>
+              <a:rPr lang="en-US" dirty="0" smtClean="0"/>
+              <a:t>Oct. 1989</a:t>
+            </a:r>
+          </a:p>
+          <a:p>
+            <a:r>
+              <a:rPr lang="en-US" dirty="0" smtClean="0"/>
+              <a:t>Last Research Unix. </a:t>
+            </a:r>
+          </a:p>
+          <a:p>
+            <a:r>
+              <a:rPr lang="en-US" dirty="0" smtClean="0"/>
+              <a:t>According to Dennis Ritchie, V9 and V10 were "conceptual": manuals existed, but no OS distributions "in complete and coherent form".</a:t>
+            </a:r>
+          </a:p>
+          <a:p>
+            <a:r>
+              <a:rPr lang="en-US" dirty="0" smtClean="0"/>
+              <a:t>Novelties included graphics typesetting tools designed to work with </a:t>
+            </a:r>
+            <a:r>
+              <a:rPr lang="en-US" dirty="0" err="1" smtClean="0"/>
+              <a:t>troff</a:t>
+            </a:r>
+            <a:r>
+              <a:rPr lang="en-US" dirty="0" smtClean="0"/>
+              <a:t>, a </a:t>
+            </a:r>
+            <a:r>
+              <a:rPr lang="en-US" b="1" dirty="0" smtClean="0"/>
+              <a:t>C interpreter</a:t>
+            </a:r>
+            <a:r>
+              <a:rPr lang="en-US" dirty="0" smtClean="0"/>
+              <a:t>, </a:t>
+            </a:r>
+            <a:r>
+              <a:rPr lang="en-US" b="1" dirty="0" smtClean="0"/>
+              <a:t>animation programs</a:t>
+            </a:r>
+            <a:r>
+              <a:rPr lang="en-US" dirty="0" smtClean="0"/>
+              <a:t>, and several tools later found in </a:t>
+            </a:r>
+            <a:r>
+              <a:rPr lang="en-US" b="1" dirty="0" smtClean="0"/>
+              <a:t>Plan 9: the Mk build tool </a:t>
+            </a:r>
+            <a:r>
+              <a:rPr lang="en-US" dirty="0" smtClean="0"/>
+              <a:t>and the</a:t>
+            </a:r>
+            <a:r>
+              <a:rPr lang="en-US" b="1" dirty="0" smtClean="0"/>
+              <a:t> </a:t>
+            </a:r>
+            <a:r>
+              <a:rPr lang="en-US" b="1" dirty="0" err="1" smtClean="0"/>
+              <a:t>rc</a:t>
+            </a:r>
+            <a:r>
+              <a:rPr lang="en-US" b="1" dirty="0" smtClean="0"/>
+              <a:t> shell</a:t>
+            </a:r>
+            <a:r>
+              <a:rPr lang="en-US" dirty="0" smtClean="0"/>
+              <a:t>. </a:t>
             </a:r>
             <a:endParaRPr lang="en-US" dirty="0"/>
           </a:p>
@@ -5220,12 +5370,12 @@
       </p:sp>
       <p:pic>
         <p:nvPicPr>
-          <p:cNvPr id="7" name="Content Placeholder 6" descr="Version_7_Unix_SIMH_PDP11_Emulation_DMR.png"/>
+          <p:cNvPr id="5" name="Content Placeholder 4" descr="images (1).jpg"/>
           <p:cNvPicPr>
             <a:picLocks noGrp="1" noChangeAspect="1"/>
           </p:cNvPicPr>
           <p:nvPr>
-            <p:ph idx="1"/>
+            <p:ph sz="half" idx="2"/>
           </p:nvPr>
         </p:nvPicPr>
         <p:blipFill>
@@ -5236,12 +5386,9 @@
         </p:blipFill>
         <p:spPr>
           <a:xfrm>
-            <a:off x="1530009" y="2146910"/>
-            <a:ext cx="6083982" cy="3881804"/>
+            <a:off x="5029200" y="2362200"/>
+            <a:ext cx="3155950" cy="2761456"/>
           </a:xfrm>
-          <a:prstGeom prst="rect">
-            <a:avLst/>
-          </a:prstGeom>
         </p:spPr>
       </p:pic>
     </p:spTree>
@@ -5271,7 +5418,7 @@
       </p:grpSpPr>
       <p:sp>
         <p:nvSpPr>
-          <p:cNvPr id="6" name="Title 5"/>
+          <p:cNvPr id="2" name="Title 1"/>
           <p:cNvSpPr>
             <a:spLocks noGrp="1"/>
           </p:cNvSpPr>
@@ -5286,7 +5433,7 @@
           <a:p>
             <a:r>
               <a:rPr lang="en-US" dirty="0" smtClean="0"/>
-              <a:t>Origin</a:t>
+              <a:t>What is UNIX?</a:t>
             </a:r>
             <a:endParaRPr lang="en-US" dirty="0"/>
           </a:p>
@@ -5294,7 +5441,7 @@
       </p:sp>
       <p:sp>
         <p:nvSpPr>
-          <p:cNvPr id="7" name="Content Placeholder 6"/>
+          <p:cNvPr id="3" name="Content Placeholder 2"/>
           <p:cNvSpPr>
             <a:spLocks noGrp="1"/>
           </p:cNvSpPr>
@@ -5310,65 +5457,30 @@
           <a:lstStyle/>
           <a:p>
             <a:r>
-              <a:rPr lang="en-US" sz="2400" dirty="0" smtClean="0"/>
-              <a:t>The pre-history of Unix dates back to the mid-1960s when the Massachusetts Institute of Technology, Bell Labs, and General Electric were developing an innovative time-sharing operating system called </a:t>
-            </a:r>
-            <a:r>
-              <a:rPr lang="en-US" sz="2400" dirty="0" err="1" smtClean="0"/>
-              <a:t>Multics</a:t>
-            </a:r>
-            <a:r>
-              <a:rPr lang="en-US" sz="2400" dirty="0" smtClean="0"/>
-              <a:t> for the GE-645 mainframe. </a:t>
-            </a:r>
-            <a:r>
-              <a:rPr lang="en-US" sz="2400" dirty="0" err="1" smtClean="0"/>
-              <a:t>Multics</a:t>
-            </a:r>
-            <a:r>
-              <a:rPr lang="en-US" sz="2400" dirty="0" smtClean="0"/>
-              <a:t> introduced many innovations, but had many problems.</a:t>
-            </a:r>
-          </a:p>
-          <a:p>
-            <a:r>
-              <a:rPr lang="en-US" sz="2400" dirty="0" smtClean="0"/>
-              <a:t>Their last researchers to leave </a:t>
-            </a:r>
-            <a:r>
-              <a:rPr lang="en-US" sz="2400" dirty="0" err="1" smtClean="0"/>
-              <a:t>Multics</a:t>
-            </a:r>
-            <a:r>
-              <a:rPr lang="en-US" sz="2400" dirty="0" smtClean="0"/>
-              <a:t>, Ken Thompson, Dennis Ritchie, M. D. </a:t>
-            </a:r>
-            <a:r>
-              <a:rPr lang="en-US" sz="2400" dirty="0" err="1" smtClean="0"/>
-              <a:t>McIlroy</a:t>
-            </a:r>
-            <a:r>
-              <a:rPr lang="en-US" sz="2400" dirty="0" smtClean="0"/>
-              <a:t>, and J. F. </a:t>
-            </a:r>
-            <a:r>
-              <a:rPr lang="en-US" sz="2400" dirty="0" err="1" smtClean="0"/>
-              <a:t>Ossanna</a:t>
-            </a:r>
-            <a:r>
-              <a:rPr lang="en-US" sz="2400" dirty="0" smtClean="0"/>
-              <a:t>, decided to redo the work on a much smaller scale.</a:t>
-            </a:r>
-          </a:p>
-          <a:p>
-            <a:endParaRPr lang="en-US" sz="2400" dirty="0" smtClean="0"/>
-          </a:p>
-          <a:p>
-            <a:endParaRPr lang="en-US" sz="2400" dirty="0"/>
+              <a:rPr lang="en-US" dirty="0"/>
+              <a:t> </a:t>
+            </a:r>
+            <a:r>
+              <a:rPr lang="en-US" dirty="0" smtClean="0"/>
+              <a:t>Unix is </a:t>
+            </a:r>
+            <a:r>
+              <a:rPr lang="en-US" dirty="0"/>
+              <a:t>a family of multitasking, multiuser computer operating systems that derive from the original AT&amp;T Unix, developed in the 1970s at the Bell Labs research center by Ken Thompson, Dennis Ritchie, and </a:t>
+            </a:r>
+            <a:r>
+              <a:rPr lang="en-US" dirty="0" smtClean="0"/>
+              <a:t>others.</a:t>
+            </a:r>
           </a:p>
         </p:txBody>
       </p:sp>
     </p:spTree>
+    <p:extLst>
+      <p:ext uri="{BB962C8B-B14F-4D97-AF65-F5344CB8AC3E}">
+        <p14:creationId xmlns:p14="http://schemas.microsoft.com/office/powerpoint/2010/main" val="274475620"/>
+      </p:ext>
+    </p:extLst>
   </p:cSld>
   <p:clrMapOvr>
     <a:masterClrMapping/>
@@ -5395,7 +5507,7 @@
       </p:grpSpPr>
       <p:sp>
         <p:nvSpPr>
-          <p:cNvPr id="5" name="Title 4"/>
+          <p:cNvPr id="2" name="Title 1"/>
           <p:cNvSpPr>
             <a:spLocks noGrp="1"/>
           </p:cNvSpPr>
@@ -5410,20 +5522,163 @@
           <a:p>
             <a:r>
               <a:rPr lang="en-US" dirty="0" smtClean="0"/>
-              <a:t>Sample Screenshots (cont.)</a:t>
-            </a:r>
+              <a:t>Programming Languages Used</a:t>
+            </a:r>
+            <a:endParaRPr lang="en-US" dirty="0"/>
+          </a:p>
+        </p:txBody>
+      </p:sp>
+      <p:sp>
+        <p:nvSpPr>
+          <p:cNvPr id="3" name="Content Placeholder 2"/>
+          <p:cNvSpPr>
+            <a:spLocks noGrp="1"/>
+          </p:cNvSpPr>
+          <p:nvPr>
+            <p:ph sz="half" idx="1"/>
+          </p:nvPr>
+        </p:nvSpPr>
+        <p:spPr>
+          <a:xfrm>
+            <a:off x="457200" y="1773936"/>
+            <a:ext cx="8305800" cy="4623816"/>
+          </a:xfrm>
+        </p:spPr>
+        <p:txBody>
+          <a:bodyPr/>
+          <a:lstStyle/>
+          <a:p>
+            <a:r>
+              <a:rPr lang="en-US" dirty="0" smtClean="0"/>
+              <a:t>C and Assembly Language</a:t>
+            </a:r>
+          </a:p>
+          <a:p>
             <a:endParaRPr lang="en-US" dirty="0"/>
           </a:p>
         </p:txBody>
       </p:sp>
       <p:pic>
         <p:nvPicPr>
-          <p:cNvPr id="6" name="Content Placeholder 5" descr="v7unix-1.png"/>
+          <p:cNvPr id="5" name="Picture 4"/>
+          <p:cNvPicPr>
+            <a:picLocks noChangeAspect="1"/>
+          </p:cNvPicPr>
+          <p:nvPr/>
+        </p:nvPicPr>
+        <p:blipFill>
+          <a:blip r:embed="rId2">
+            <a:extLst>
+              <a:ext uri="{28A0092B-C50C-407E-A947-70E740481C1C}">
+                <a14:useLocalDpi xmlns:a14="http://schemas.microsoft.com/office/drawing/2010/main" val="0"/>
+              </a:ext>
+            </a:extLst>
+          </a:blip>
+          <a:stretch>
+            <a:fillRect/>
+          </a:stretch>
+        </p:blipFill>
+        <p:spPr>
+          <a:xfrm>
+            <a:off x="1295400" y="2743200"/>
+            <a:ext cx="2857500" cy="2857500"/>
+          </a:xfrm>
+          <a:prstGeom prst="rect">
+            <a:avLst/>
+          </a:prstGeom>
+        </p:spPr>
+      </p:pic>
+      <p:pic>
+        <p:nvPicPr>
+          <p:cNvPr id="6" name="Picture 5"/>
+          <p:cNvPicPr>
+            <a:picLocks noChangeAspect="1"/>
+          </p:cNvPicPr>
+          <p:nvPr/>
+        </p:nvPicPr>
+        <p:blipFill>
+          <a:blip r:embed="rId3">
+            <a:extLst>
+              <a:ext uri="{28A0092B-C50C-407E-A947-70E740481C1C}">
+                <a14:useLocalDpi xmlns:a14="http://schemas.microsoft.com/office/drawing/2010/main" val="0"/>
+              </a:ext>
+            </a:extLst>
+          </a:blip>
+          <a:stretch>
+            <a:fillRect/>
+          </a:stretch>
+        </p:blipFill>
+        <p:spPr>
+          <a:xfrm>
+            <a:off x="4628573" y="2895600"/>
+            <a:ext cx="3317164" cy="2667000"/>
+          </a:xfrm>
+          <a:prstGeom prst="rect">
+            <a:avLst/>
+          </a:prstGeom>
+        </p:spPr>
+      </p:pic>
+    </p:spTree>
+    <p:extLst>
+      <p:ext uri="{BB962C8B-B14F-4D97-AF65-F5344CB8AC3E}">
+        <p14:creationId xmlns:p14="http://schemas.microsoft.com/office/powerpoint/2010/main" val="578926825"/>
+      </p:ext>
+    </p:extLst>
+  </p:cSld>
+  <p:clrMapOvr>
+    <a:masterClrMapping/>
+  </p:clrMapOvr>
+</p:sld>
+</file>
+
+<file path=ppt/slides/slide21.xml><?xml version="1.0" encoding="utf-8"?>
+<p:sld xmlns:a="http://schemas.openxmlformats.org/drawingml/2006/main" xmlns:r="http://schemas.openxmlformats.org/officeDocument/2006/relationships" xmlns:p="http://schemas.openxmlformats.org/presentationml/2006/main">
+  <p:cSld>
+    <p:spTree>
+      <p:nvGrpSpPr>
+        <p:cNvPr id="1" name=""/>
+        <p:cNvGrpSpPr/>
+        <p:nvPr/>
+      </p:nvGrpSpPr>
+      <p:grpSpPr>
+        <a:xfrm>
+          <a:off x="0" y="0"/>
+          <a:ext cx="0" cy="0"/>
+          <a:chOff x="0" y="0"/>
+          <a:chExt cx="0" cy="0"/>
+        </a:xfrm>
+      </p:grpSpPr>
+      <p:sp>
+        <p:nvSpPr>
+          <p:cNvPr id="2" name="Title 1"/>
+          <p:cNvSpPr>
+            <a:spLocks noGrp="1"/>
+          </p:cNvSpPr>
+          <p:nvPr>
+            <p:ph type="title"/>
+          </p:nvPr>
+        </p:nvSpPr>
+        <p:spPr/>
+        <p:txBody>
+          <a:bodyPr/>
+          <a:lstStyle/>
+          <a:p>
+            <a:r>
+              <a:rPr lang="en-US" dirty="0" smtClean="0"/>
+              <a:t>Sample Screenshots</a:t>
+            </a:r>
+            <a:endParaRPr lang="en-US" dirty="0"/>
+          </a:p>
+        </p:txBody>
+      </p:sp>
+      <p:pic>
+        <p:nvPicPr>
+          <p:cNvPr id="5" name="Content Placeholder 4" descr="lynis-screenshot.png"/>
           <p:cNvPicPr>
             <a:picLocks noGrp="1" noChangeAspect="1"/>
           </p:cNvPicPr>
           <p:nvPr>
-            <p:ph idx="1"/>
+            <p:ph sz="half" idx="1"/>
           </p:nvPr>
         </p:nvPicPr>
         <p:blipFill>
@@ -5434,7 +5689,152 @@
         </p:blipFill>
         <p:spPr>
           <a:xfrm>
-            <a:off x="1447800" y="1774825"/>
+            <a:off x="1600200" y="1752600"/>
+            <a:ext cx="6165849" cy="4624387"/>
+          </a:xfrm>
+        </p:spPr>
+      </p:pic>
+    </p:spTree>
+  </p:cSld>
+  <p:clrMapOvr>
+    <a:masterClrMapping/>
+  </p:clrMapOvr>
+</p:sld>
+</file>
+
+<file path=ppt/slides/slide22.xml><?xml version="1.0" encoding="utf-8"?>
+<p:sld xmlns:a="http://schemas.openxmlformats.org/drawingml/2006/main" xmlns:r="http://schemas.openxmlformats.org/officeDocument/2006/relationships" xmlns:p="http://schemas.openxmlformats.org/presentationml/2006/main">
+  <p:cSld>
+    <p:spTree>
+      <p:nvGrpSpPr>
+        <p:cNvPr id="1" name=""/>
+        <p:cNvGrpSpPr/>
+        <p:nvPr/>
+      </p:nvGrpSpPr>
+      <p:grpSpPr>
+        <a:xfrm>
+          <a:off x="0" y="0"/>
+          <a:ext cx="0" cy="0"/>
+          <a:chOff x="0" y="0"/>
+          <a:chExt cx="0" cy="0"/>
+        </a:xfrm>
+      </p:grpSpPr>
+      <p:sp>
+        <p:nvSpPr>
+          <p:cNvPr id="5" name="Title 4"/>
+          <p:cNvSpPr>
+            <a:spLocks noGrp="1"/>
+          </p:cNvSpPr>
+          <p:nvPr>
+            <p:ph type="title"/>
+          </p:nvPr>
+        </p:nvSpPr>
+        <p:spPr/>
+        <p:txBody>
+          <a:bodyPr/>
+          <a:lstStyle/>
+          <a:p>
+            <a:r>
+              <a:rPr lang="en-US" dirty="0" smtClean="0"/>
+              <a:t>Sample Screenshots (cont.)</a:t>
+            </a:r>
+            <a:endParaRPr lang="en-US" dirty="0"/>
+          </a:p>
+        </p:txBody>
+      </p:sp>
+      <p:pic>
+        <p:nvPicPr>
+          <p:cNvPr id="7" name="Content Placeholder 6" descr="Version_7_Unix_SIMH_PDP11_Emulation_DMR.png"/>
+          <p:cNvPicPr>
+            <a:picLocks noGrp="1" noChangeAspect="1"/>
+          </p:cNvPicPr>
+          <p:nvPr>
+            <p:ph idx="1"/>
+          </p:nvPr>
+        </p:nvPicPr>
+        <p:blipFill>
+          <a:blip r:embed="rId2"/>
+          <a:stretch>
+            <a:fillRect/>
+          </a:stretch>
+        </p:blipFill>
+        <p:spPr>
+          <a:xfrm>
+            <a:off x="1530009" y="2146910"/>
+            <a:ext cx="6083982" cy="3881804"/>
+          </a:xfrm>
+          <a:prstGeom prst="rect">
+            <a:avLst/>
+          </a:prstGeom>
+        </p:spPr>
+      </p:pic>
+    </p:spTree>
+  </p:cSld>
+  <p:clrMapOvr>
+    <a:masterClrMapping/>
+  </p:clrMapOvr>
+</p:sld>
+</file>
+
+<file path=ppt/slides/slide23.xml><?xml version="1.0" encoding="utf-8"?>
+<p:sld xmlns:a="http://schemas.openxmlformats.org/drawingml/2006/main" xmlns:r="http://schemas.openxmlformats.org/officeDocument/2006/relationships" xmlns:p="http://schemas.openxmlformats.org/presentationml/2006/main">
+  <p:cSld>
+    <p:spTree>
+      <p:nvGrpSpPr>
+        <p:cNvPr id="1" name=""/>
+        <p:cNvGrpSpPr/>
+        <p:nvPr/>
+      </p:nvGrpSpPr>
+      <p:grpSpPr>
+        <a:xfrm>
+          <a:off x="0" y="0"/>
+          <a:ext cx="0" cy="0"/>
+          <a:chOff x="0" y="0"/>
+          <a:chExt cx="0" cy="0"/>
+        </a:xfrm>
+      </p:grpSpPr>
+      <p:sp>
+        <p:nvSpPr>
+          <p:cNvPr id="5" name="Title 4"/>
+          <p:cNvSpPr>
+            <a:spLocks noGrp="1"/>
+          </p:cNvSpPr>
+          <p:nvPr>
+            <p:ph type="title"/>
+          </p:nvPr>
+        </p:nvSpPr>
+        <p:spPr/>
+        <p:txBody>
+          <a:bodyPr/>
+          <a:lstStyle/>
+          <a:p>
+            <a:r>
+              <a:rPr lang="en-US" dirty="0" smtClean="0"/>
+              <a:t>Sample Screenshots (cont.)</a:t>
+            </a:r>
+            <a:endParaRPr lang="en-US" dirty="0"/>
+          </a:p>
+        </p:txBody>
+      </p:sp>
+      <p:pic>
+        <p:nvPicPr>
+          <p:cNvPr id="6" name="Content Placeholder 5" descr="v7unix-1.png"/>
+          <p:cNvPicPr>
+            <a:picLocks noGrp="1" noChangeAspect="1"/>
+          </p:cNvPicPr>
+          <p:nvPr>
+            <p:ph idx="1"/>
+          </p:nvPr>
+        </p:nvPicPr>
+        <p:blipFill>
+          <a:blip r:embed="rId2"/>
+          <a:stretch>
+            <a:fillRect/>
+          </a:stretch>
+        </p:blipFill>
+        <p:spPr>
+          <a:xfrm>
+            <a:off x="1295400" y="1905000"/>
             <a:ext cx="6629399" cy="4625975"/>
           </a:xfrm>
           <a:prstGeom prst="rect">
@@ -5484,7 +5884,7 @@
           <a:p>
             <a:r>
               <a:rPr lang="en-US" dirty="0" smtClean="0"/>
-              <a:t>Origin (cont.)</a:t>
+              <a:t>What is UNIX? (cont.)</a:t>
             </a:r>
             <a:endParaRPr lang="en-US" dirty="0"/>
           </a:p>
@@ -5500,60 +5900,48 @@
             <p:ph idx="1"/>
           </p:nvPr>
         </p:nvSpPr>
-        <p:spPr/>
+        <p:spPr>
+          <a:xfrm>
+            <a:off x="457200" y="1600200"/>
+            <a:ext cx="8229600" cy="4625609"/>
+          </a:xfrm>
+        </p:spPr>
         <p:txBody>
           <a:bodyPr>
-            <a:normAutofit/>
+            <a:normAutofit fontScale="92500" lnSpcReduction="10000"/>
           </a:bodyPr>
           <a:lstStyle/>
           <a:p>
             <a:r>
-              <a:rPr lang="en-US" sz="2800" dirty="0" smtClean="0"/>
-              <a:t>The name </a:t>
-            </a:r>
-            <a:r>
-              <a:rPr lang="en-US" sz="2800" dirty="0" err="1" smtClean="0"/>
-              <a:t>Unics</a:t>
-            </a:r>
-            <a:r>
-              <a:rPr lang="en-US" sz="2800" dirty="0" smtClean="0"/>
-              <a:t> (</a:t>
-            </a:r>
-            <a:r>
-              <a:rPr lang="en-US" sz="2800" dirty="0" err="1" smtClean="0"/>
-              <a:t>Uniplexed</a:t>
-            </a:r>
-            <a:r>
-              <a:rPr lang="en-US" sz="2800" dirty="0" smtClean="0"/>
-              <a:t> Information and Computing Service, pronounced as "eunuchs"), a pun on </a:t>
-            </a:r>
-            <a:r>
-              <a:rPr lang="en-US" sz="2800" dirty="0" err="1" smtClean="0"/>
-              <a:t>Multics</a:t>
-            </a:r>
-            <a:r>
-              <a:rPr lang="en-US" sz="2800" dirty="0" smtClean="0"/>
-              <a:t> (Multiplexed Information and Computer Services), was initially suggested for the project in 1970: the new operating system was an emasculated </a:t>
-            </a:r>
-            <a:r>
-              <a:rPr lang="en-US" sz="2800" dirty="0" err="1" smtClean="0"/>
-              <a:t>Multics</a:t>
-            </a:r>
-            <a:r>
-              <a:rPr lang="en-US" sz="2800" dirty="0" smtClean="0"/>
-              <a:t>. </a:t>
-            </a:r>
-          </a:p>
-          <a:p>
-            <a:r>
-              <a:rPr lang="en-US" sz="2800" dirty="0" smtClean="0"/>
-              <a:t>Brian Kernighan claims the coining for himself, and adds that "no one can remember" who came up with the final spelling Unix.</a:t>
-            </a:r>
-            <a:endParaRPr lang="en-US" sz="2800" dirty="0"/>
+              <a:rPr lang="en-US" dirty="0"/>
+              <a:t>From the power user's or programmer's perspective, Unix systems are characterized by a modular design that is sometimes called the "Unix philosophy", meaning that the operating system provides a set of simple tools that each perform a limited, well-defined function,[6] with a unified </a:t>
+            </a:r>
+            <a:r>
+              <a:rPr lang="en-US" dirty="0" err="1"/>
+              <a:t>filesystem</a:t>
+            </a:r>
+            <a:r>
+              <a:rPr lang="en-US" dirty="0"/>
+              <a:t> as the main means of </a:t>
+            </a:r>
+            <a:r>
+              <a:rPr lang="en-US" dirty="0" smtClean="0"/>
+              <a:t>communication and </a:t>
+            </a:r>
+            <a:r>
+              <a:rPr lang="en-US" dirty="0"/>
+              <a:t>a shell scripting and command language to combine the tools to perform complex workflows.</a:t>
+            </a:r>
+            <a:endParaRPr lang="en-US" dirty="0"/>
           </a:p>
         </p:txBody>
       </p:sp>
     </p:spTree>
+    <p:extLst>
+      <p:ext uri="{BB962C8B-B14F-4D97-AF65-F5344CB8AC3E}">
+        <p14:creationId xmlns:p14="http://schemas.microsoft.com/office/powerpoint/2010/main" val="3268812054"/>
+      </p:ext>
+    </p:extLst>
   </p:cSld>
   <p:clrMapOvr>
     <a:masterClrMapping/>
@@ -5580,12 +5968,35 @@
       </p:grpSpPr>
       <p:sp>
         <p:nvSpPr>
-          <p:cNvPr id="2" name="Title 1"/>
+          <p:cNvPr id="6" name="Title 5"/>
           <p:cNvSpPr>
             <a:spLocks noGrp="1"/>
           </p:cNvSpPr>
           <p:nvPr>
             <p:ph type="title"/>
+          </p:nvPr>
+        </p:nvSpPr>
+        <p:spPr/>
+        <p:txBody>
+          <a:bodyPr/>
+          <a:lstStyle/>
+          <a:p>
+            <a:r>
+              <a:rPr lang="en-US" dirty="0" smtClean="0"/>
+              <a:t>Origin</a:t>
+            </a:r>
+            <a:endParaRPr lang="en-US" dirty="0"/>
+          </a:p>
+        </p:txBody>
+      </p:sp>
+      <p:sp>
+        <p:nvSpPr>
+          <p:cNvPr id="7" name="Content Placeholder 6"/>
+          <p:cNvSpPr>
+            <a:spLocks noGrp="1"/>
+          </p:cNvSpPr>
+          <p:nvPr>
+            <p:ph idx="1"/>
           </p:nvPr>
         </p:nvSpPr>
         <p:spPr/>
@@ -5596,61 +6007,64 @@
           <a:lstStyle/>
           <a:p>
             <a:r>
-              <a:rPr lang="en-US" dirty="0" smtClean="0"/>
-              <a:t>Developers - Dennis Ritchie</a:t>
-            </a:r>
-            <a:endParaRPr lang="en-US" dirty="0"/>
-          </a:p>
-        </p:txBody>
-      </p:sp>
-      <p:sp>
-        <p:nvSpPr>
-          <p:cNvPr id="3" name="Content Placeholder 2"/>
-          <p:cNvSpPr>
-            <a:spLocks noGrp="1"/>
-          </p:cNvSpPr>
-          <p:nvPr>
-            <p:ph sz="half" idx="1"/>
-          </p:nvPr>
-        </p:nvSpPr>
-        <p:spPr/>
-        <p:txBody>
-          <a:bodyPr/>
-          <a:lstStyle/>
-          <a:p>
-            <a:r>
-              <a:rPr lang="en-US" dirty="0" smtClean="0"/>
-              <a:t>He created the C programming language and, with long-time colleague Ken Thompson, the Unix operating system.</a:t>
-            </a:r>
-          </a:p>
-          <a:p>
-            <a:endParaRPr lang="en-US" dirty="0" smtClean="0"/>
-          </a:p>
-        </p:txBody>
-      </p:sp>
-      <p:pic>
-        <p:nvPicPr>
-          <p:cNvPr id="7" name="Content Placeholder 6" descr="download.jpg"/>
-          <p:cNvPicPr>
-            <a:picLocks noGrp="1" noChangeAspect="1"/>
-          </p:cNvPicPr>
-          <p:nvPr>
-            <p:ph sz="half" idx="2"/>
-          </p:nvPr>
-        </p:nvPicPr>
-        <p:blipFill>
-          <a:blip r:embed="rId2"/>
-          <a:stretch>
-            <a:fillRect/>
-          </a:stretch>
-        </p:blipFill>
-        <p:spPr>
-          <a:xfrm>
-            <a:off x="4876800" y="2133600"/>
-            <a:ext cx="3429000" cy="3886200"/>
-          </a:xfrm>
-        </p:spPr>
-      </p:pic>
+              <a:rPr lang="en-US" sz="2400" dirty="0" smtClean="0"/>
+              <a:t>The pre-history of Unix dates back to the mid-1960s when the Massachusetts Institute of Technology, Bell Labs, and General Electric were developing an innovative time-sharing operating system called </a:t>
+            </a:r>
+            <a:r>
+              <a:rPr lang="en-US" sz="2400" dirty="0" err="1" smtClean="0"/>
+              <a:t>Multics</a:t>
+            </a:r>
+            <a:r>
+              <a:rPr lang="en-US" sz="2400" dirty="0" smtClean="0"/>
+              <a:t> for the GE-645 mainframe. </a:t>
+            </a:r>
+            <a:r>
+              <a:rPr lang="en-US" sz="2400" dirty="0" err="1" smtClean="0"/>
+              <a:t>Multics</a:t>
+            </a:r>
+            <a:r>
+              <a:rPr lang="en-US" sz="2400" dirty="0" smtClean="0"/>
+              <a:t> introduced many innovations, but had many problems.</a:t>
+            </a:r>
+          </a:p>
+          <a:p>
+            <a:r>
+              <a:rPr lang="en-US" sz="2400" dirty="0" smtClean="0"/>
+              <a:t>Their last researchers to leave </a:t>
+            </a:r>
+            <a:r>
+              <a:rPr lang="en-US" sz="2400" dirty="0" err="1" smtClean="0"/>
+              <a:t>Multics</a:t>
+            </a:r>
+            <a:r>
+              <a:rPr lang="en-US" sz="2400" dirty="0" smtClean="0"/>
+              <a:t>, Ken Thompson, Dennis Ritchie, M. D. </a:t>
+            </a:r>
+            <a:r>
+              <a:rPr lang="en-US" sz="2400" dirty="0" err="1" smtClean="0"/>
+              <a:t>McIlroy</a:t>
+            </a:r>
+            <a:r>
+              <a:rPr lang="en-US" sz="2400" dirty="0" smtClean="0"/>
+              <a:t>, and J. F. </a:t>
+            </a:r>
+            <a:r>
+              <a:rPr lang="en-US" sz="2400" dirty="0" err="1" smtClean="0"/>
+              <a:t>Ossanna</a:t>
+            </a:r>
+            <a:r>
+              <a:rPr lang="en-US" sz="2400" dirty="0" smtClean="0"/>
+              <a:t>, decided to redo the work on a much smaller scale.</a:t>
+            </a:r>
+          </a:p>
+          <a:p>
+            <a:endParaRPr lang="en-US" sz="2400" dirty="0" smtClean="0"/>
+          </a:p>
+          <a:p>
+            <a:endParaRPr lang="en-US" sz="2400" dirty="0"/>
+          </a:p>
+        </p:txBody>
+      </p:sp>
     </p:spTree>
   </p:cSld>
   <p:clrMapOvr>
@@ -5693,38 +6107,75 @@
           <a:p>
             <a:r>
               <a:rPr lang="en-US" dirty="0" smtClean="0"/>
-              <a:t>Developers – Dennis Ritchie</a:t>
+              <a:t>Origin (cont.)</a:t>
             </a:r>
             <a:endParaRPr lang="en-US" dirty="0"/>
           </a:p>
         </p:txBody>
       </p:sp>
-      <p:pic>
-        <p:nvPicPr>
-          <p:cNvPr id="4" name="Content Placeholder 3" descr="quote-unix-is-basically-a-simple-operating-system-but-you-have-to-be-a-genius-to-understand-dennis-ritchie-24-60-27.jpg"/>
-          <p:cNvPicPr>
-            <a:picLocks noGrp="1" noChangeAspect="1"/>
-          </p:cNvPicPr>
+      <p:sp>
+        <p:nvSpPr>
+          <p:cNvPr id="3" name="Content Placeholder 2"/>
+          <p:cNvSpPr>
+            <a:spLocks noGrp="1"/>
+          </p:cNvSpPr>
           <p:nvPr>
             <p:ph idx="1"/>
           </p:nvPr>
-        </p:nvPicPr>
-        <p:blipFill>
-          <a:blip r:embed="rId2"/>
-          <a:stretch>
-            <a:fillRect/>
-          </a:stretch>
-        </p:blipFill>
-        <p:spPr>
-          <a:xfrm>
-            <a:off x="457200" y="2151436"/>
-            <a:ext cx="8229600" cy="3872753"/>
-          </a:xfrm>
-          <a:prstGeom prst="rect">
-            <a:avLst/>
-          </a:prstGeom>
-        </p:spPr>
-      </p:pic>
+        </p:nvSpPr>
+        <p:spPr/>
+        <p:txBody>
+          <a:bodyPr>
+            <a:normAutofit/>
+          </a:bodyPr>
+          <a:lstStyle/>
+          <a:p>
+            <a:r>
+              <a:rPr lang="en-US" sz="2800" dirty="0" smtClean="0"/>
+              <a:t>The name </a:t>
+            </a:r>
+            <a:r>
+              <a:rPr lang="en-US" sz="2800" dirty="0" err="1" smtClean="0"/>
+              <a:t>Unics</a:t>
+            </a:r>
+            <a:r>
+              <a:rPr lang="en-US" sz="2800" dirty="0" smtClean="0"/>
+              <a:t> (</a:t>
+            </a:r>
+            <a:r>
+              <a:rPr lang="en-US" sz="2800" dirty="0" err="1" smtClean="0"/>
+              <a:t>Uniplexed</a:t>
+            </a:r>
+            <a:r>
+              <a:rPr lang="en-US" sz="2800" dirty="0" smtClean="0"/>
+              <a:t> Information and Computing Service, pronounced as "eunuchs"), a pun on </a:t>
+            </a:r>
+            <a:r>
+              <a:rPr lang="en-US" sz="2800" dirty="0" err="1" smtClean="0"/>
+              <a:t>Multics</a:t>
+            </a:r>
+            <a:r>
+              <a:rPr lang="en-US" sz="2800" dirty="0" smtClean="0"/>
+              <a:t> (Multiplexed Information and Computer Services), was initially suggested for the project in 1970: the new operating system was an emasculated </a:t>
+            </a:r>
+            <a:r>
+              <a:rPr lang="en-US" sz="2800" dirty="0" err="1" smtClean="0"/>
+              <a:t>Multics</a:t>
+            </a:r>
+            <a:r>
+              <a:rPr lang="en-US" sz="2800" dirty="0" smtClean="0"/>
+              <a:t>. </a:t>
+            </a:r>
+          </a:p>
+          <a:p>
+            <a:r>
+              <a:rPr lang="en-US" sz="2800" dirty="0" smtClean="0"/>
+              <a:t>Brian Kernighan claims the coining for himself, and adds that "no one can remember" who came up with the final spelling Unix.</a:t>
+            </a:r>
+            <a:endParaRPr lang="en-US" sz="2800" dirty="0"/>
+          </a:p>
+        </p:txBody>
+      </p:sp>
     </p:spTree>
   </p:cSld>
   <p:clrMapOvr>
@@ -5762,12 +6213,14 @@
         </p:nvSpPr>
         <p:spPr/>
         <p:txBody>
-          <a:bodyPr/>
-          <a:lstStyle/>
-          <a:p>
-            <a:r>
-              <a:rPr lang="en-US" dirty="0" smtClean="0"/>
-              <a:t>Developers – Ken Thompson</a:t>
+          <a:bodyPr>
+            <a:normAutofit/>
+          </a:bodyPr>
+          <a:lstStyle/>
+          <a:p>
+            <a:r>
+              <a:rPr lang="en-US" dirty="0" smtClean="0"/>
+              <a:t>Developers - Dennis Ritchie</a:t>
             </a:r>
             <a:endParaRPr lang="en-US" dirty="0"/>
           </a:p>
@@ -5785,22 +6238,22 @@
         </p:nvSpPr>
         <p:spPr/>
         <p:txBody>
-          <a:bodyPr>
-            <a:normAutofit fontScale="92500"/>
-          </a:bodyPr>
-          <a:lstStyle/>
-          <a:p>
-            <a:r>
-              <a:rPr lang="en-US" dirty="0" smtClean="0"/>
-              <a:t>Having worked at Bell Labs for most of his career, Thompson designed and implemented the original Unix operating system. He also invented the B programming language, the direct predecessor to the C programming language.</a:t>
-            </a:r>
-            <a:endParaRPr lang="en-US" dirty="0"/>
+          <a:bodyPr/>
+          <a:lstStyle/>
+          <a:p>
+            <a:r>
+              <a:rPr lang="en-US" dirty="0" smtClean="0"/>
+              <a:t>He created the C programming language and, with long-time colleague Ken Thompson, the Unix operating system.</a:t>
+            </a:r>
+          </a:p>
+          <a:p>
+            <a:endParaRPr lang="en-US" dirty="0" smtClean="0"/>
           </a:p>
         </p:txBody>
       </p:sp>
       <p:pic>
         <p:nvPicPr>
-          <p:cNvPr id="5" name="Content Placeholder 4" descr="quote-one-of-my-most-productive-days-was-throwing-away-1-000-lines-of-code-ken-thompson-29-37-61.jpg"/>
+          <p:cNvPr id="7" name="Content Placeholder 6" descr="download.jpg"/>
           <p:cNvPicPr>
             <a:picLocks noGrp="1" noChangeAspect="1"/>
           </p:cNvPicPr>
@@ -5816,8 +6269,8 @@
         </p:blipFill>
         <p:spPr>
           <a:xfrm>
-            <a:off x="4648200" y="2209800"/>
-            <a:ext cx="4038600" cy="3505200"/>
+            <a:off x="4876800" y="2133600"/>
+            <a:ext cx="3429000" cy="3886200"/>
           </a:xfrm>
         </p:spPr>
       </p:pic>
@@ -5863,44 +6316,20 @@
           <a:p>
             <a:r>
               <a:rPr lang="en-US" dirty="0" smtClean="0"/>
-              <a:t>Developers – Ken Thompson</a:t>
+              <a:t>Developers – Dennis Ritchie</a:t>
             </a:r>
             <a:endParaRPr lang="en-US" dirty="0"/>
-          </a:p>
-        </p:txBody>
-      </p:sp>
-      <p:sp>
-        <p:nvSpPr>
-          <p:cNvPr id="3" name="Content Placeholder 2"/>
-          <p:cNvSpPr>
-            <a:spLocks noGrp="1"/>
-          </p:cNvSpPr>
-          <p:nvPr>
-            <p:ph sz="half" idx="1"/>
-          </p:nvPr>
-        </p:nvSpPr>
-        <p:spPr/>
-        <p:txBody>
-          <a:bodyPr>
-            <a:normAutofit/>
-          </a:bodyPr>
-          <a:lstStyle/>
-          <a:p>
-            <a:r>
-              <a:rPr lang="en-US" sz="2000" dirty="0" smtClean="0"/>
-              <a:t>Unix Philosophy –   is a set of cultural norms and philosophical approaches to minimalist, modular software development. It emphasizes building simple, short, clear, modular, and extensible code that can be easily maintained and repurposed by developers other than its creators.</a:t>
-            </a:r>
           </a:p>
         </p:txBody>
       </p:sp>
       <p:pic>
         <p:nvPicPr>
-          <p:cNvPr id="5" name="Content Placeholder 4" descr="quote-this-is-the-unix-philosophy-write-programs-that-do-one-thing-and-do-it-well-write-programs-douglas-mcilroy-81-95-07.jpg"/>
+          <p:cNvPr id="4" name="Content Placeholder 3" descr="quote-unix-is-basically-a-simple-operating-system-but-you-have-to-be-a-genius-to-understand-dennis-ritchie-24-60-27.jpg"/>
           <p:cNvPicPr>
             <a:picLocks noGrp="1" noChangeAspect="1"/>
           </p:cNvPicPr>
           <p:nvPr>
-            <p:ph sz="half" idx="2"/>
+            <p:ph idx="1"/>
           </p:nvPr>
         </p:nvPicPr>
         <p:blipFill>
@@ -5911,9 +6340,12 @@
         </p:blipFill>
         <p:spPr>
           <a:xfrm>
-            <a:off x="4648200" y="2057400"/>
-            <a:ext cx="4038600" cy="3657600"/>
+            <a:off x="457200" y="2151436"/>
+            <a:ext cx="8229600" cy="3872753"/>
           </a:xfrm>
+          <a:prstGeom prst="rect">
+            <a:avLst/>
+          </a:prstGeom>
         </p:spPr>
       </p:pic>
     </p:spTree>
@@ -5943,7 +6375,7 @@
       </p:grpSpPr>
       <p:sp>
         <p:nvSpPr>
-          <p:cNvPr id="5" name="Title 4"/>
+          <p:cNvPr id="2" name="Title 1"/>
           <p:cNvSpPr>
             <a:spLocks noGrp="1"/>
           </p:cNvSpPr>
@@ -5958,7 +6390,7 @@
           <a:p>
             <a:r>
               <a:rPr lang="en-US" dirty="0" smtClean="0"/>
-              <a:t>Developers</a:t>
+              <a:t>Developers – Ken Thompson</a:t>
             </a:r>
             <a:endParaRPr lang="en-US" dirty="0"/>
           </a:p>
@@ -5966,7 +6398,7 @@
       </p:sp>
       <p:sp>
         <p:nvSpPr>
-          <p:cNvPr id="6" name="Content Placeholder 5"/>
+          <p:cNvPr id="3" name="Content Placeholder 2"/>
           <p:cNvSpPr>
             <a:spLocks noGrp="1"/>
           </p:cNvSpPr>
@@ -5976,44 +6408,22 @@
         </p:nvSpPr>
         <p:spPr/>
         <p:txBody>
-          <a:bodyPr/>
-          <a:lstStyle/>
-          <a:p>
-            <a:r>
-              <a:rPr lang="en-US" dirty="0" smtClean="0"/>
-              <a:t>Brian Wilson Kernighan</a:t>
-            </a:r>
-          </a:p>
-          <a:p>
-            <a:r>
-              <a:rPr lang="en-US" dirty="0" smtClean="0"/>
-              <a:t>M. D. </a:t>
-            </a:r>
-            <a:r>
-              <a:rPr lang="en-US" dirty="0" err="1" smtClean="0"/>
-              <a:t>Mcllroy</a:t>
-            </a:r>
-            <a:endParaRPr lang="en-US" dirty="0" smtClean="0"/>
-          </a:p>
-          <a:p>
-            <a:r>
-              <a:rPr lang="en-US" dirty="0" smtClean="0"/>
-              <a:t>Joe </a:t>
-            </a:r>
-            <a:r>
-              <a:rPr lang="en-US" dirty="0" err="1" smtClean="0"/>
-              <a:t>Ossanna</a:t>
-            </a:r>
-            <a:endParaRPr lang="en-US" dirty="0" smtClean="0"/>
-          </a:p>
-          <a:p>
+          <a:bodyPr>
+            <a:normAutofit fontScale="92500"/>
+          </a:bodyPr>
+          <a:lstStyle/>
+          <a:p>
+            <a:r>
+              <a:rPr lang="en-US" dirty="0" smtClean="0"/>
+              <a:t>Having worked at Bell Labs for most of his career, Thompson designed and implemented the original Unix operating system. He also invented the B programming language, the direct predecessor to the C programming language.</a:t>
+            </a:r>
             <a:endParaRPr lang="en-US" dirty="0"/>
           </a:p>
         </p:txBody>
       </p:sp>
       <p:pic>
         <p:nvPicPr>
-          <p:cNvPr id="8" name="Content Placeholder 7" descr="quote-debugging-is-twice-as-hard-as-writing-the-code-in-the-first-place-therefore-if-you-write-brian-kernighan-66-91-06.jpg"/>
+          <p:cNvPr id="5" name="Content Placeholder 4" descr="quote-one-of-my-most-productive-days-was-throwing-away-1-000-lines-of-code-ken-thompson-29-37-61.jpg"/>
           <p:cNvPicPr>
             <a:picLocks noGrp="1" noChangeAspect="1"/>
           </p:cNvPicPr>
@@ -6029,8 +6439,8 @@
         </p:blipFill>
         <p:spPr>
           <a:xfrm>
-            <a:off x="4572000" y="2133600"/>
-            <a:ext cx="4343400" cy="3810000"/>
+            <a:off x="4648200" y="2209800"/>
+            <a:ext cx="4038600" cy="3505200"/>
           </a:xfrm>
         </p:spPr>
       </p:pic>
@@ -6076,15 +6486,7 @@
           <a:p>
             <a:r>
               <a:rPr lang="en-US" dirty="0" smtClean="0"/>
-              <a:t>Versions - 1</a:t>
-            </a:r>
-            <a:r>
-              <a:rPr lang="en-US" baseline="30000" dirty="0" smtClean="0"/>
-              <a:t>st</a:t>
-            </a:r>
-            <a:r>
-              <a:rPr lang="en-US" dirty="0" smtClean="0"/>
-              <a:t> Edition</a:t>
+              <a:t>Developers – Ken Thompson</a:t>
             </a:r>
             <a:endParaRPr lang="en-US" dirty="0"/>
           </a:p>
@@ -6103,43 +6505,20 @@
         <p:spPr/>
         <p:txBody>
           <a:bodyPr>
-            <a:normAutofit fontScale="92500"/>
+            <a:normAutofit/>
           </a:bodyPr>
           <a:lstStyle/>
           <a:p>
             <a:r>
-              <a:rPr lang="en-US" dirty="0" smtClean="0"/>
-              <a:t>Released Nov. 3, 1971.</a:t>
-            </a:r>
-          </a:p>
-          <a:p>
-            <a:r>
-              <a:rPr lang="en-US" dirty="0" smtClean="0"/>
-              <a:t>based on the version that ran on the PDP-11 at the time. Includes the </a:t>
-            </a:r>
-            <a:r>
-              <a:rPr lang="en-US" b="1" dirty="0" smtClean="0"/>
-              <a:t>Thompson shell, mail, cp, and </a:t>
-            </a:r>
-            <a:r>
-              <a:rPr lang="en-US" b="1" dirty="0" err="1" smtClean="0"/>
-              <a:t>su</a:t>
-            </a:r>
-            <a:r>
-              <a:rPr lang="en-US" b="1" dirty="0" smtClean="0"/>
-              <a:t>. </a:t>
-            </a:r>
-            <a:r>
-              <a:rPr lang="en-US" dirty="0" smtClean="0"/>
-              <a:t>The operating system was two years old, having been ported from the PDP-7 to the PDP-11/20 in 1970.</a:t>
-            </a:r>
-            <a:endParaRPr lang="en-US" dirty="0"/>
+              <a:rPr lang="en-US" sz="2000" dirty="0" smtClean="0"/>
+              <a:t>Unix Philosophy –   is a set of cultural norms and philosophical approaches to minimalist, modular software development. It emphasizes building simple, short, clear, modular, and extensible code that can be easily maintained and repurposed by developers other than its creators.</a:t>
+            </a:r>
           </a:p>
         </p:txBody>
       </p:sp>
       <p:pic>
         <p:nvPicPr>
-          <p:cNvPr id="5" name="Content Placeholder 4" descr="dennis-richie-and-brian-kernighan-pdp-11.jpg"/>
+          <p:cNvPr id="5" name="Content Placeholder 4" descr="quote-this-is-the-unix-philosophy-write-programs-that-do-one-thing-and-do-it-well-write-programs-douglas-mcilroy-81-95-07.jpg"/>
           <p:cNvPicPr>
             <a:picLocks noGrp="1" noChangeAspect="1"/>
           </p:cNvPicPr>
@@ -6155,8 +6534,8 @@
         </p:blipFill>
         <p:spPr>
           <a:xfrm>
-            <a:off x="4648200" y="2749328"/>
-            <a:ext cx="4038600" cy="2672207"/>
+            <a:off x="4648200" y="2057400"/>
+            <a:ext cx="4038600" cy="3657600"/>
           </a:xfrm>
         </p:spPr>
       </p:pic>

</xml_diff>